<commit_message>
Update IDEAS FOR PROBLEM STATEMENT 5.pptx
</commit_message>
<xml_diff>
--- a/IDEAS FOR PROBLEM STATEMENT 5.pptx
+++ b/IDEAS FOR PROBLEM STATEMENT 5.pptx
@@ -2,27 +2,24 @@
 <file path=ppt/presentation.xml><?xml version="1.0" encoding="utf-8"?>
 <p:presentation xmlns:a="http://schemas.openxmlformats.org/drawingml/2006/main" xmlns:r="http://schemas.openxmlformats.org/officeDocument/2006/relationships" xmlns:p="http://schemas.openxmlformats.org/presentationml/2006/main" strictFirstAndLastChars="0" embedTrueTypeFonts="1" saveSubsetFonts="1" autoCompressPictures="0">
   <p:sldMasterIdLst>
-    <p:sldMasterId id="2147483659" r:id="rId1"/>
+    <p:sldMasterId id="2147483648" r:id="rId1"/>
   </p:sldMasterIdLst>
   <p:notesMasterIdLst>
-    <p:notesMasterId r:id="rId7"/>
+    <p:notesMasterId r:id="rId4"/>
   </p:notesMasterIdLst>
   <p:sldIdLst>
-    <p:sldId id="256" r:id="rId2"/>
-    <p:sldId id="257" r:id="rId3"/>
-    <p:sldId id="258" r:id="rId4"/>
-    <p:sldId id="259" r:id="rId5"/>
-    <p:sldId id="260" r:id="rId6"/>
+    <p:sldId id="256" r:id="rId3"/>
+    <p:sldId id="257" r:id="rId5"/>
+    <p:sldId id="258" r:id="rId6"/>
+    <p:sldId id="259" r:id="rId7"/>
+    <p:sldId id="260" r:id="rId8"/>
   </p:sldIdLst>
   <p:sldSz cx="9144000" cy="5143500" type="screen16x9"/>
   <p:notesSz cx="6858000" cy="9144000"/>
   <p:embeddedFontLst>
     <p:embeddedFont>
-      <p:font typeface="Roboto" panose="02000000000000000000" pitchFamily="2" charset="0"/>
-      <p:regular r:id="rId8"/>
-      <p:bold r:id="rId9"/>
-      <p:italic r:id="rId10"/>
-      <p:boldItalic r:id="rId11"/>
+      <p:font typeface="Roboto" panose="02000000000000000000"/>
+      <p:regular r:id="rId12"/>
     </p:embeddedFont>
   </p:embeddedFontLst>
   <p:defaultTextStyle>
@@ -50,15 +47,15 @@
       <a:buClr>
         <a:srgbClr val="000000"/>
       </a:buClr>
-      <a:buFont typeface="Arial"/>
+      <a:buFont typeface="Arial" panose="020B0604020202020204"/>
       <a:defRPr sz="1400" b="0" i="0" u="none" strike="noStrike" cap="none">
         <a:solidFill>
           <a:srgbClr val="000000"/>
         </a:solidFill>
-        <a:latin typeface="Arial"/>
-        <a:ea typeface="Arial"/>
-        <a:cs typeface="Arial"/>
-        <a:sym typeface="Arial"/>
+        <a:latin typeface="Arial" panose="020B0604020202020204"/>
+        <a:ea typeface="Arial" panose="020B0604020202020204"/>
+        <a:cs typeface="Arial" panose="020B0604020202020204"/>
+        <a:sym typeface="Arial" panose="020B0604020202020204"/>
       </a:defRPr>
     </a:lvl1pPr>
     <a:lvl2pPr marR="0" lvl="1" algn="l" rtl="0">
@@ -74,15 +71,15 @@
       <a:buClr>
         <a:srgbClr val="000000"/>
       </a:buClr>
-      <a:buFont typeface="Arial"/>
+      <a:buFont typeface="Arial" panose="020B0604020202020204"/>
       <a:defRPr sz="1400" b="0" i="0" u="none" strike="noStrike" cap="none">
         <a:solidFill>
           <a:srgbClr val="000000"/>
         </a:solidFill>
-        <a:latin typeface="Arial"/>
-        <a:ea typeface="Arial"/>
-        <a:cs typeface="Arial"/>
-        <a:sym typeface="Arial"/>
+        <a:latin typeface="Arial" panose="020B0604020202020204"/>
+        <a:ea typeface="Arial" panose="020B0604020202020204"/>
+        <a:cs typeface="Arial" panose="020B0604020202020204"/>
+        <a:sym typeface="Arial" panose="020B0604020202020204"/>
       </a:defRPr>
     </a:lvl2pPr>
     <a:lvl3pPr marR="0" lvl="2" algn="l" rtl="0">
@@ -98,15 +95,15 @@
       <a:buClr>
         <a:srgbClr val="000000"/>
       </a:buClr>
-      <a:buFont typeface="Arial"/>
+      <a:buFont typeface="Arial" panose="020B0604020202020204"/>
       <a:defRPr sz="1400" b="0" i="0" u="none" strike="noStrike" cap="none">
         <a:solidFill>
           <a:srgbClr val="000000"/>
         </a:solidFill>
-        <a:latin typeface="Arial"/>
-        <a:ea typeface="Arial"/>
-        <a:cs typeface="Arial"/>
-        <a:sym typeface="Arial"/>
+        <a:latin typeface="Arial" panose="020B0604020202020204"/>
+        <a:ea typeface="Arial" panose="020B0604020202020204"/>
+        <a:cs typeface="Arial" panose="020B0604020202020204"/>
+        <a:sym typeface="Arial" panose="020B0604020202020204"/>
       </a:defRPr>
     </a:lvl3pPr>
     <a:lvl4pPr marR="0" lvl="3" algn="l" rtl="0">
@@ -122,15 +119,15 @@
       <a:buClr>
         <a:srgbClr val="000000"/>
       </a:buClr>
-      <a:buFont typeface="Arial"/>
+      <a:buFont typeface="Arial" panose="020B0604020202020204"/>
       <a:defRPr sz="1400" b="0" i="0" u="none" strike="noStrike" cap="none">
         <a:solidFill>
           <a:srgbClr val="000000"/>
         </a:solidFill>
-        <a:latin typeface="Arial"/>
-        <a:ea typeface="Arial"/>
-        <a:cs typeface="Arial"/>
-        <a:sym typeface="Arial"/>
+        <a:latin typeface="Arial" panose="020B0604020202020204"/>
+        <a:ea typeface="Arial" panose="020B0604020202020204"/>
+        <a:cs typeface="Arial" panose="020B0604020202020204"/>
+        <a:sym typeface="Arial" panose="020B0604020202020204"/>
       </a:defRPr>
     </a:lvl4pPr>
     <a:lvl5pPr marR="0" lvl="4" algn="l" rtl="0">
@@ -146,15 +143,15 @@
       <a:buClr>
         <a:srgbClr val="000000"/>
       </a:buClr>
-      <a:buFont typeface="Arial"/>
+      <a:buFont typeface="Arial" panose="020B0604020202020204"/>
       <a:defRPr sz="1400" b="0" i="0" u="none" strike="noStrike" cap="none">
         <a:solidFill>
           <a:srgbClr val="000000"/>
         </a:solidFill>
-        <a:latin typeface="Arial"/>
-        <a:ea typeface="Arial"/>
-        <a:cs typeface="Arial"/>
-        <a:sym typeface="Arial"/>
+        <a:latin typeface="Arial" panose="020B0604020202020204"/>
+        <a:ea typeface="Arial" panose="020B0604020202020204"/>
+        <a:cs typeface="Arial" panose="020B0604020202020204"/>
+        <a:sym typeface="Arial" panose="020B0604020202020204"/>
       </a:defRPr>
     </a:lvl5pPr>
     <a:lvl6pPr marR="0" lvl="5" algn="l" rtl="0">
@@ -170,15 +167,15 @@
       <a:buClr>
         <a:srgbClr val="000000"/>
       </a:buClr>
-      <a:buFont typeface="Arial"/>
+      <a:buFont typeface="Arial" panose="020B0604020202020204"/>
       <a:defRPr sz="1400" b="0" i="0" u="none" strike="noStrike" cap="none">
         <a:solidFill>
           <a:srgbClr val="000000"/>
         </a:solidFill>
-        <a:latin typeface="Arial"/>
-        <a:ea typeface="Arial"/>
-        <a:cs typeface="Arial"/>
-        <a:sym typeface="Arial"/>
+        <a:latin typeface="Arial" panose="020B0604020202020204"/>
+        <a:ea typeface="Arial" panose="020B0604020202020204"/>
+        <a:cs typeface="Arial" panose="020B0604020202020204"/>
+        <a:sym typeface="Arial" panose="020B0604020202020204"/>
       </a:defRPr>
     </a:lvl6pPr>
     <a:lvl7pPr marR="0" lvl="6" algn="l" rtl="0">
@@ -194,15 +191,15 @@
       <a:buClr>
         <a:srgbClr val="000000"/>
       </a:buClr>
-      <a:buFont typeface="Arial"/>
+      <a:buFont typeface="Arial" panose="020B0604020202020204"/>
       <a:defRPr sz="1400" b="0" i="0" u="none" strike="noStrike" cap="none">
         <a:solidFill>
           <a:srgbClr val="000000"/>
         </a:solidFill>
-        <a:latin typeface="Arial"/>
-        <a:ea typeface="Arial"/>
-        <a:cs typeface="Arial"/>
-        <a:sym typeface="Arial"/>
+        <a:latin typeface="Arial" panose="020B0604020202020204"/>
+        <a:ea typeface="Arial" panose="020B0604020202020204"/>
+        <a:cs typeface="Arial" panose="020B0604020202020204"/>
+        <a:sym typeface="Arial" panose="020B0604020202020204"/>
       </a:defRPr>
     </a:lvl7pPr>
     <a:lvl8pPr marR="0" lvl="7" algn="l" rtl="0">
@@ -218,15 +215,15 @@
       <a:buClr>
         <a:srgbClr val="000000"/>
       </a:buClr>
-      <a:buFont typeface="Arial"/>
+      <a:buFont typeface="Arial" panose="020B0604020202020204"/>
       <a:defRPr sz="1400" b="0" i="0" u="none" strike="noStrike" cap="none">
         <a:solidFill>
           <a:srgbClr val="000000"/>
         </a:solidFill>
-        <a:latin typeface="Arial"/>
-        <a:ea typeface="Arial"/>
-        <a:cs typeface="Arial"/>
-        <a:sym typeface="Arial"/>
+        <a:latin typeface="Arial" panose="020B0604020202020204"/>
+        <a:ea typeface="Arial" panose="020B0604020202020204"/>
+        <a:cs typeface="Arial" panose="020B0604020202020204"/>
+        <a:sym typeface="Arial" panose="020B0604020202020204"/>
       </a:defRPr>
     </a:lvl8pPr>
     <a:lvl9pPr marR="0" lvl="8" algn="l" rtl="0">
@@ -242,34 +239,18 @@
       <a:buClr>
         <a:srgbClr val="000000"/>
       </a:buClr>
-      <a:buFont typeface="Arial"/>
+      <a:buFont typeface="Arial" panose="020B0604020202020204"/>
       <a:defRPr sz="1400" b="0" i="0" u="none" strike="noStrike" cap="none">
         <a:solidFill>
           <a:srgbClr val="000000"/>
         </a:solidFill>
-        <a:latin typeface="Arial"/>
-        <a:ea typeface="Arial"/>
-        <a:cs typeface="Arial"/>
-        <a:sym typeface="Arial"/>
+        <a:latin typeface="Arial" panose="020B0604020202020204"/>
+        <a:ea typeface="Arial" panose="020B0604020202020204"/>
+        <a:cs typeface="Arial" panose="020B0604020202020204"/>
+        <a:sym typeface="Arial" panose="020B0604020202020204"/>
       </a:defRPr>
     </a:lvl9pPr>
   </p:defaultTextStyle>
-  <p:extLst>
-    <p:ext uri="{EFAFB233-063F-42B5-8137-9DF3F51BA10A}">
-      <p15:sldGuideLst xmlns:p15="http://schemas.microsoft.com/office/powerpoint/2012/main">
-        <p15:guide id="1" orient="horz" pos="1620">
-          <p15:clr>
-            <a:srgbClr val="A4A3A4"/>
-          </p15:clr>
-        </p15:guide>
-        <p15:guide id="2" pos="2880">
-          <p15:clr>
-            <a:srgbClr val="A4A3A4"/>
-          </p15:clr>
-        </p15:guide>
-      </p15:sldGuideLst>
-    </p:ext>
-  </p:extLst>
 </p:presentation>
 </file>
 
@@ -474,9 +455,7 @@
               <a:defRPr sz="1100"/>
             </a:lvl9pPr>
           </a:lstStyle>
-          <a:p>
-            <a:endParaRPr/>
-          </a:p>
+          <a:p/>
         </p:txBody>
       </p:sp>
     </p:spTree>
@@ -507,15 +486,15 @@
       <a:buClr>
         <a:srgbClr val="000000"/>
       </a:buClr>
-      <a:buFont typeface="Arial"/>
+      <a:buFont typeface="Arial" panose="020B0604020202020204"/>
       <a:defRPr sz="1400" b="0" i="0" u="none" strike="noStrike" cap="none">
         <a:solidFill>
           <a:srgbClr val="000000"/>
         </a:solidFill>
-        <a:latin typeface="Arial"/>
-        <a:ea typeface="Arial"/>
-        <a:cs typeface="Arial"/>
-        <a:sym typeface="Arial"/>
+        <a:latin typeface="Arial" panose="020B0604020202020204"/>
+        <a:ea typeface="Arial" panose="020B0604020202020204"/>
+        <a:cs typeface="Arial" panose="020B0604020202020204"/>
+        <a:sym typeface="Arial" panose="020B0604020202020204"/>
       </a:defRPr>
     </a:lvl1pPr>
     <a:lvl2pPr marR="0" lvl="1" algn="l" rtl="0">
@@ -531,15 +510,15 @@
       <a:buClr>
         <a:srgbClr val="000000"/>
       </a:buClr>
-      <a:buFont typeface="Arial"/>
+      <a:buFont typeface="Arial" panose="020B0604020202020204"/>
       <a:defRPr sz="1400" b="0" i="0" u="none" strike="noStrike" cap="none">
         <a:solidFill>
           <a:srgbClr val="000000"/>
         </a:solidFill>
-        <a:latin typeface="Arial"/>
-        <a:ea typeface="Arial"/>
-        <a:cs typeface="Arial"/>
-        <a:sym typeface="Arial"/>
+        <a:latin typeface="Arial" panose="020B0604020202020204"/>
+        <a:ea typeface="Arial" panose="020B0604020202020204"/>
+        <a:cs typeface="Arial" panose="020B0604020202020204"/>
+        <a:sym typeface="Arial" panose="020B0604020202020204"/>
       </a:defRPr>
     </a:lvl2pPr>
     <a:lvl3pPr marR="0" lvl="2" algn="l" rtl="0">
@@ -555,15 +534,15 @@
       <a:buClr>
         <a:srgbClr val="000000"/>
       </a:buClr>
-      <a:buFont typeface="Arial"/>
+      <a:buFont typeface="Arial" panose="020B0604020202020204"/>
       <a:defRPr sz="1400" b="0" i="0" u="none" strike="noStrike" cap="none">
         <a:solidFill>
           <a:srgbClr val="000000"/>
         </a:solidFill>
-        <a:latin typeface="Arial"/>
-        <a:ea typeface="Arial"/>
-        <a:cs typeface="Arial"/>
-        <a:sym typeface="Arial"/>
+        <a:latin typeface="Arial" panose="020B0604020202020204"/>
+        <a:ea typeface="Arial" panose="020B0604020202020204"/>
+        <a:cs typeface="Arial" panose="020B0604020202020204"/>
+        <a:sym typeface="Arial" panose="020B0604020202020204"/>
       </a:defRPr>
     </a:lvl3pPr>
     <a:lvl4pPr marR="0" lvl="3" algn="l" rtl="0">
@@ -579,15 +558,15 @@
       <a:buClr>
         <a:srgbClr val="000000"/>
       </a:buClr>
-      <a:buFont typeface="Arial"/>
+      <a:buFont typeface="Arial" panose="020B0604020202020204"/>
       <a:defRPr sz="1400" b="0" i="0" u="none" strike="noStrike" cap="none">
         <a:solidFill>
           <a:srgbClr val="000000"/>
         </a:solidFill>
-        <a:latin typeface="Arial"/>
-        <a:ea typeface="Arial"/>
-        <a:cs typeface="Arial"/>
-        <a:sym typeface="Arial"/>
+        <a:latin typeface="Arial" panose="020B0604020202020204"/>
+        <a:ea typeface="Arial" panose="020B0604020202020204"/>
+        <a:cs typeface="Arial" panose="020B0604020202020204"/>
+        <a:sym typeface="Arial" panose="020B0604020202020204"/>
       </a:defRPr>
     </a:lvl4pPr>
     <a:lvl5pPr marR="0" lvl="4" algn="l" rtl="0">
@@ -603,15 +582,15 @@
       <a:buClr>
         <a:srgbClr val="000000"/>
       </a:buClr>
-      <a:buFont typeface="Arial"/>
+      <a:buFont typeface="Arial" panose="020B0604020202020204"/>
       <a:defRPr sz="1400" b="0" i="0" u="none" strike="noStrike" cap="none">
         <a:solidFill>
           <a:srgbClr val="000000"/>
         </a:solidFill>
-        <a:latin typeface="Arial"/>
-        <a:ea typeface="Arial"/>
-        <a:cs typeface="Arial"/>
-        <a:sym typeface="Arial"/>
+        <a:latin typeface="Arial" panose="020B0604020202020204"/>
+        <a:ea typeface="Arial" panose="020B0604020202020204"/>
+        <a:cs typeface="Arial" panose="020B0604020202020204"/>
+        <a:sym typeface="Arial" panose="020B0604020202020204"/>
       </a:defRPr>
     </a:lvl5pPr>
     <a:lvl6pPr marR="0" lvl="5" algn="l" rtl="0">
@@ -627,15 +606,15 @@
       <a:buClr>
         <a:srgbClr val="000000"/>
       </a:buClr>
-      <a:buFont typeface="Arial"/>
+      <a:buFont typeface="Arial" panose="020B0604020202020204"/>
       <a:defRPr sz="1400" b="0" i="0" u="none" strike="noStrike" cap="none">
         <a:solidFill>
           <a:srgbClr val="000000"/>
         </a:solidFill>
-        <a:latin typeface="Arial"/>
-        <a:ea typeface="Arial"/>
-        <a:cs typeface="Arial"/>
-        <a:sym typeface="Arial"/>
+        <a:latin typeface="Arial" panose="020B0604020202020204"/>
+        <a:ea typeface="Arial" panose="020B0604020202020204"/>
+        <a:cs typeface="Arial" panose="020B0604020202020204"/>
+        <a:sym typeface="Arial" panose="020B0604020202020204"/>
       </a:defRPr>
     </a:lvl6pPr>
     <a:lvl7pPr marR="0" lvl="6" algn="l" rtl="0">
@@ -651,15 +630,15 @@
       <a:buClr>
         <a:srgbClr val="000000"/>
       </a:buClr>
-      <a:buFont typeface="Arial"/>
+      <a:buFont typeface="Arial" panose="020B0604020202020204"/>
       <a:defRPr sz="1400" b="0" i="0" u="none" strike="noStrike" cap="none">
         <a:solidFill>
           <a:srgbClr val="000000"/>
         </a:solidFill>
-        <a:latin typeface="Arial"/>
-        <a:ea typeface="Arial"/>
-        <a:cs typeface="Arial"/>
-        <a:sym typeface="Arial"/>
+        <a:latin typeface="Arial" panose="020B0604020202020204"/>
+        <a:ea typeface="Arial" panose="020B0604020202020204"/>
+        <a:cs typeface="Arial" panose="020B0604020202020204"/>
+        <a:sym typeface="Arial" panose="020B0604020202020204"/>
       </a:defRPr>
     </a:lvl7pPr>
     <a:lvl8pPr marR="0" lvl="7" algn="l" rtl="0">
@@ -675,15 +654,15 @@
       <a:buClr>
         <a:srgbClr val="000000"/>
       </a:buClr>
-      <a:buFont typeface="Arial"/>
+      <a:buFont typeface="Arial" panose="020B0604020202020204"/>
       <a:defRPr sz="1400" b="0" i="0" u="none" strike="noStrike" cap="none">
         <a:solidFill>
           <a:srgbClr val="000000"/>
         </a:solidFill>
-        <a:latin typeface="Arial"/>
-        <a:ea typeface="Arial"/>
-        <a:cs typeface="Arial"/>
-        <a:sym typeface="Arial"/>
+        <a:latin typeface="Arial" panose="020B0604020202020204"/>
+        <a:ea typeface="Arial" panose="020B0604020202020204"/>
+        <a:cs typeface="Arial" panose="020B0604020202020204"/>
+        <a:sym typeface="Arial" panose="020B0604020202020204"/>
       </a:defRPr>
     </a:lvl8pPr>
     <a:lvl9pPr marR="0" lvl="8" algn="l" rtl="0">
@@ -699,15 +678,15 @@
       <a:buClr>
         <a:srgbClr val="000000"/>
       </a:buClr>
-      <a:buFont typeface="Arial"/>
+      <a:buFont typeface="Arial" panose="020B0604020202020204"/>
       <a:defRPr sz="1400" b="0" i="0" u="none" strike="noStrike" cap="none">
         <a:solidFill>
           <a:srgbClr val="000000"/>
         </a:solidFill>
-        <a:latin typeface="Arial"/>
-        <a:ea typeface="Arial"/>
-        <a:cs typeface="Arial"/>
-        <a:sym typeface="Arial"/>
+        <a:latin typeface="Arial" panose="020B0604020202020204"/>
+        <a:ea typeface="Arial" panose="020B0604020202020204"/>
+        <a:cs typeface="Arial" panose="020B0604020202020204"/>
+        <a:sym typeface="Arial" panose="020B0604020202020204"/>
       </a:defRPr>
     </a:lvl9pPr>
   </p:notesStyle>
@@ -715,7 +694,7 @@
 </file>
 
 <file path=ppt/notesSlides/notesSlide1.xml><?xml version="1.0" encoding="utf-8"?>
-<p:notes xmlns:a="http://schemas.openxmlformats.org/drawingml/2006/main" xmlns:r="http://schemas.openxmlformats.org/officeDocument/2006/relationships" xmlns:p="http://schemas.openxmlformats.org/presentationml/2006/main" showMasterSp="0" showMasterPhAnim="0">
+<p:notes xmlns:a="http://schemas.openxmlformats.org/drawingml/2006/main" xmlns:r="http://schemas.openxmlformats.org/officeDocument/2006/relationships" xmlns:p="http://schemas.openxmlformats.org/presentationml/2006/main" showMasterPhAnim="0" showMasterSp="0">
   <p:cSld>
     <p:spTree>
       <p:nvGrpSpPr>
@@ -806,7 +785,6 @@
               </a:spcAft>
               <a:buNone/>
             </a:pPr>
-            <a:endParaRPr/>
           </a:p>
         </p:txBody>
       </p:sp>
@@ -819,7 +797,7 @@
 </file>
 
 <file path=ppt/notesSlides/notesSlide2.xml><?xml version="1.0" encoding="utf-8"?>
-<p:notes xmlns:a="http://schemas.openxmlformats.org/drawingml/2006/main" xmlns:r="http://schemas.openxmlformats.org/officeDocument/2006/relationships" xmlns:p="http://schemas.openxmlformats.org/presentationml/2006/main" showMasterSp="0" showMasterPhAnim="0">
+<p:notes xmlns:a="http://schemas.openxmlformats.org/drawingml/2006/main" xmlns:r="http://schemas.openxmlformats.org/officeDocument/2006/relationships" xmlns:p="http://schemas.openxmlformats.org/presentationml/2006/main" showMasterPhAnim="0" showMasterSp="0">
   <p:cSld>
     <p:spTree>
       <p:nvGrpSpPr>
@@ -910,7 +888,6 @@
               </a:spcAft>
               <a:buNone/>
             </a:pPr>
-            <a:endParaRPr/>
           </a:p>
         </p:txBody>
       </p:sp>
@@ -923,7 +900,7 @@
 </file>
 
 <file path=ppt/notesSlides/notesSlide3.xml><?xml version="1.0" encoding="utf-8"?>
-<p:notes xmlns:a="http://schemas.openxmlformats.org/drawingml/2006/main" xmlns:r="http://schemas.openxmlformats.org/officeDocument/2006/relationships" xmlns:p="http://schemas.openxmlformats.org/presentationml/2006/main" showMasterSp="0" showMasterPhAnim="0">
+<p:notes xmlns:a="http://schemas.openxmlformats.org/drawingml/2006/main" xmlns:r="http://schemas.openxmlformats.org/officeDocument/2006/relationships" xmlns:p="http://schemas.openxmlformats.org/presentationml/2006/main" showMasterPhAnim="0" showMasterSp="0">
   <p:cSld>
     <p:spTree>
       <p:nvGrpSpPr>
@@ -1014,7 +991,6 @@
               </a:spcAft>
               <a:buNone/>
             </a:pPr>
-            <a:endParaRPr/>
           </a:p>
         </p:txBody>
       </p:sp>
@@ -1027,7 +1003,7 @@
 </file>
 
 <file path=ppt/notesSlides/notesSlide4.xml><?xml version="1.0" encoding="utf-8"?>
-<p:notes xmlns:a="http://schemas.openxmlformats.org/drawingml/2006/main" xmlns:r="http://schemas.openxmlformats.org/officeDocument/2006/relationships" xmlns:p="http://schemas.openxmlformats.org/presentationml/2006/main" showMasterSp="0" showMasterPhAnim="0">
+<p:notes xmlns:a="http://schemas.openxmlformats.org/drawingml/2006/main" xmlns:r="http://schemas.openxmlformats.org/officeDocument/2006/relationships" xmlns:p="http://schemas.openxmlformats.org/presentationml/2006/main" showMasterPhAnim="0" showMasterSp="0">
   <p:cSld>
     <p:spTree>
       <p:nvGrpSpPr>
@@ -1118,7 +1094,6 @@
               </a:spcAft>
               <a:buNone/>
             </a:pPr>
-            <a:endParaRPr/>
           </a:p>
         </p:txBody>
       </p:sp>
@@ -1131,7 +1106,7 @@
 </file>
 
 <file path=ppt/notesSlides/notesSlide5.xml><?xml version="1.0" encoding="utf-8"?>
-<p:notes xmlns:a="http://schemas.openxmlformats.org/drawingml/2006/main" xmlns:r="http://schemas.openxmlformats.org/officeDocument/2006/relationships" xmlns:p="http://schemas.openxmlformats.org/presentationml/2006/main" showMasterSp="0" showMasterPhAnim="0">
+<p:notes xmlns:a="http://schemas.openxmlformats.org/drawingml/2006/main" xmlns:r="http://schemas.openxmlformats.org/officeDocument/2006/relationships" xmlns:p="http://schemas.openxmlformats.org/presentationml/2006/main" showMasterPhAnim="0" showMasterSp="0">
   <p:cSld>
     <p:spTree>
       <p:nvGrpSpPr>
@@ -1222,7 +1197,6 @@
               </a:spcAft>
               <a:buNone/>
             </a:pPr>
-            <a:endParaRPr/>
           </a:p>
         </p:txBody>
       </p:sp>
@@ -1235,7 +1209,7 @@
 </file>
 
 <file path=ppt/slideLayouts/slideLayout1.xml><?xml version="1.0" encoding="utf-8"?>
-<p:sldLayout xmlns:a="http://schemas.openxmlformats.org/drawingml/2006/main" xmlns:r="http://schemas.openxmlformats.org/officeDocument/2006/relationships" xmlns:p="http://schemas.openxmlformats.org/presentationml/2006/main" matchingName="Title slide" type="title">
+<p:sldLayout xmlns:a="http://schemas.openxmlformats.org/drawingml/2006/main" xmlns:r="http://schemas.openxmlformats.org/officeDocument/2006/relationships" xmlns:p="http://schemas.openxmlformats.org/presentationml/2006/main" type="title" matchingName="Title slide">
   <p:cSld name="TITLE">
     <p:bg>
       <p:bgPr>
@@ -1309,7 +1283,6 @@
                 </a:spcAft>
                 <a:buNone/>
               </a:pPr>
-              <a:endParaRPr/>
             </a:p>
           </p:txBody>
         </p:sp>
@@ -1349,7 +1322,6 @@
                 </a:spcAft>
                 <a:buNone/>
               </a:pPr>
-              <a:endParaRPr/>
             </a:p>
           </p:txBody>
         </p:sp>
@@ -1389,7 +1361,6 @@
                 </a:spcAft>
                 <a:buNone/>
               </a:pPr>
-              <a:endParaRPr/>
             </a:p>
           </p:txBody>
         </p:sp>
@@ -1429,7 +1400,6 @@
                 </a:spcAft>
                 <a:buNone/>
               </a:pPr>
-              <a:endParaRPr/>
             </a:p>
           </p:txBody>
         </p:sp>
@@ -1469,7 +1439,6 @@
                 </a:spcAft>
                 <a:buNone/>
               </a:pPr>
-              <a:endParaRPr/>
             </a:p>
           </p:txBody>
         </p:sp>
@@ -1661,9 +1630,7 @@
               </a:defRPr>
             </a:lvl9pPr>
           </a:lstStyle>
-          <a:p>
-            <a:endParaRPr/>
-          </a:p>
+          <a:p/>
         </p:txBody>
       </p:sp>
       <p:sp>
@@ -1880,9 +1847,7 @@
               </a:defRPr>
             </a:lvl9pPr>
           </a:lstStyle>
-          <a:p>
-            <a:endParaRPr/>
-          </a:p>
+          <a:p/>
         </p:txBody>
       </p:sp>
       <p:sp>
@@ -1957,10 +1922,9 @@
               <a:buNone/>
             </a:pPr>
             <a:fld id="{00000000-1234-1234-1234-123412341234}" type="slidenum">
-              <a:rPr lang="en"/>
-              <a:t>‹#›</a:t>
+              <a:rPr lang="en-GB"/>
             </a:fld>
-            <a:endParaRPr/>
+            <a:endParaRPr lang="en-GB"/>
           </a:p>
         </p:txBody>
       </p:sp>
@@ -2047,7 +2011,6 @@
                 </a:spcAft>
                 <a:buNone/>
               </a:pPr>
-              <a:endParaRPr/>
             </a:p>
           </p:txBody>
         </p:sp>
@@ -2087,7 +2050,6 @@
                 </a:spcAft>
                 <a:buNone/>
               </a:pPr>
-              <a:endParaRPr/>
             </a:p>
           </p:txBody>
         </p:sp>
@@ -2127,7 +2089,6 @@
                 </a:spcAft>
                 <a:buNone/>
               </a:pPr>
-              <a:endParaRPr/>
             </a:p>
           </p:txBody>
         </p:sp>
@@ -2167,7 +2128,6 @@
                 </a:spcAft>
                 <a:buNone/>
               </a:pPr>
-              <a:endParaRPr/>
             </a:p>
           </p:txBody>
         </p:sp>
@@ -2207,7 +2167,6 @@
                 </a:spcAft>
                 <a:buNone/>
               </a:pPr>
-              <a:endParaRPr/>
             </a:p>
           </p:txBody>
         </p:sp>
@@ -2593,9 +2552,7 @@
               </a:defRPr>
             </a:lvl9pPr>
           </a:lstStyle>
-          <a:p>
-            <a:endParaRPr/>
-          </a:p>
+          <a:p/>
         </p:txBody>
       </p:sp>
       <p:sp>
@@ -2670,10 +2627,9 @@
               <a:buNone/>
             </a:pPr>
             <a:fld id="{00000000-1234-1234-1234-123412341234}" type="slidenum">
-              <a:rPr lang="en"/>
-              <a:t>‹#›</a:t>
+              <a:rPr lang="en-GB"/>
             </a:fld>
-            <a:endParaRPr/>
+            <a:endParaRPr lang="en-GB"/>
           </a:p>
         </p:txBody>
       </p:sp>
@@ -2686,7 +2642,7 @@
 </file>
 
 <file path=ppt/slideLayouts/slideLayout11.xml><?xml version="1.0" encoding="utf-8"?>
-<p:sldLayout xmlns:a="http://schemas.openxmlformats.org/drawingml/2006/main" xmlns:r="http://schemas.openxmlformats.org/officeDocument/2006/relationships" xmlns:p="http://schemas.openxmlformats.org/presentationml/2006/main" matchingName="Blank" type="blank">
+<p:sldLayout xmlns:a="http://schemas.openxmlformats.org/drawingml/2006/main" xmlns:r="http://schemas.openxmlformats.org/officeDocument/2006/relationships" xmlns:p="http://schemas.openxmlformats.org/presentationml/2006/main" type="blank" matchingName="Blank">
   <p:cSld name="BLANK">
     <p:spTree>
       <p:nvGrpSpPr>
@@ -2810,10 +2766,9 @@
               <a:buNone/>
             </a:pPr>
             <a:fld id="{00000000-1234-1234-1234-123412341234}" type="slidenum">
-              <a:rPr lang="en"/>
-              <a:t>‹#›</a:t>
+              <a:rPr lang="en-GB"/>
             </a:fld>
-            <a:endParaRPr/>
+            <a:endParaRPr lang="en-GB"/>
           </a:p>
         </p:txBody>
       </p:sp>
@@ -2826,7 +2781,7 @@
 </file>
 
 <file path=ppt/slideLayouts/slideLayout2.xml><?xml version="1.0" encoding="utf-8"?>
-<p:sldLayout xmlns:a="http://schemas.openxmlformats.org/drawingml/2006/main" xmlns:r="http://schemas.openxmlformats.org/officeDocument/2006/relationships" xmlns:p="http://schemas.openxmlformats.org/presentationml/2006/main" matchingName="Section header" type="secHead">
+<p:sldLayout xmlns:a="http://schemas.openxmlformats.org/drawingml/2006/main" xmlns:r="http://schemas.openxmlformats.org/officeDocument/2006/relationships" xmlns:p="http://schemas.openxmlformats.org/presentationml/2006/main" type="secHead" matchingName="Section header">
   <p:cSld name="SECTION_HEADER">
     <p:bg>
       <p:bgPr>
@@ -2900,7 +2855,6 @@
                 </a:spcAft>
                 <a:buNone/>
               </a:pPr>
-              <a:endParaRPr/>
             </a:p>
           </p:txBody>
         </p:sp>
@@ -2940,7 +2894,6 @@
                 </a:spcAft>
                 <a:buNone/>
               </a:pPr>
-              <a:endParaRPr/>
             </a:p>
           </p:txBody>
         </p:sp>
@@ -2980,7 +2933,6 @@
                 </a:spcAft>
                 <a:buNone/>
               </a:pPr>
-              <a:endParaRPr/>
             </a:p>
           </p:txBody>
         </p:sp>
@@ -3020,7 +2972,6 @@
                 </a:spcAft>
                 <a:buNone/>
               </a:pPr>
-              <a:endParaRPr/>
             </a:p>
           </p:txBody>
         </p:sp>
@@ -3060,7 +3011,6 @@
                 </a:spcAft>
                 <a:buNone/>
               </a:pPr>
-              <a:endParaRPr/>
             </a:p>
           </p:txBody>
         </p:sp>
@@ -3252,9 +3202,7 @@
               </a:defRPr>
             </a:lvl9pPr>
           </a:lstStyle>
-          <a:p>
-            <a:endParaRPr/>
-          </a:p>
+          <a:p/>
         </p:txBody>
       </p:sp>
       <p:sp>
@@ -3329,10 +3277,9 @@
               <a:buNone/>
             </a:pPr>
             <a:fld id="{00000000-1234-1234-1234-123412341234}" type="slidenum">
-              <a:rPr lang="en"/>
-              <a:t>‹#›</a:t>
+              <a:rPr lang="en-GB"/>
             </a:fld>
-            <a:endParaRPr/>
+            <a:endParaRPr lang="en-GB"/>
           </a:p>
         </p:txBody>
       </p:sp>
@@ -3345,7 +3292,7 @@
 </file>
 
 <file path=ppt/slideLayouts/slideLayout3.xml><?xml version="1.0" encoding="utf-8"?>
-<p:sldLayout xmlns:a="http://schemas.openxmlformats.org/drawingml/2006/main" xmlns:r="http://schemas.openxmlformats.org/officeDocument/2006/relationships" xmlns:p="http://schemas.openxmlformats.org/presentationml/2006/main" matchingName="Title and body" type="tx">
+<p:sldLayout xmlns:a="http://schemas.openxmlformats.org/drawingml/2006/main" xmlns:r="http://schemas.openxmlformats.org/officeDocument/2006/relationships" xmlns:p="http://schemas.openxmlformats.org/presentationml/2006/main" type="tx" matchingName="Title and body">
   <p:cSld name="TITLE_AND_BODY">
     <p:spTree>
       <p:nvGrpSpPr>
@@ -3411,7 +3358,6 @@
                 </a:spcAft>
                 <a:buNone/>
               </a:pPr>
-              <a:endParaRPr/>
             </a:p>
           </p:txBody>
         </p:sp>
@@ -3451,7 +3397,6 @@
                 </a:spcAft>
                 <a:buNone/>
               </a:pPr>
-              <a:endParaRPr/>
             </a:p>
           </p:txBody>
         </p:sp>
@@ -3491,7 +3436,6 @@
                 </a:spcAft>
                 <a:buNone/>
               </a:pPr>
-              <a:endParaRPr/>
             </a:p>
           </p:txBody>
         </p:sp>
@@ -3531,7 +3475,6 @@
                 </a:spcAft>
                 <a:buNone/>
               </a:pPr>
-              <a:endParaRPr/>
             </a:p>
           </p:txBody>
         </p:sp>
@@ -3571,7 +3514,6 @@
                 </a:spcAft>
                 <a:buNone/>
               </a:pPr>
-              <a:endParaRPr/>
             </a:p>
           </p:txBody>
         </p:sp>
@@ -3700,9 +3642,7 @@
               <a:defRPr/>
             </a:lvl9pPr>
           </a:lstStyle>
-          <a:p>
-            <a:endParaRPr/>
-          </a:p>
+          <a:p/>
         </p:txBody>
       </p:sp>
       <p:sp>
@@ -3829,9 +3769,7 @@
               <a:defRPr/>
             </a:lvl9pPr>
           </a:lstStyle>
-          <a:p>
-            <a:endParaRPr/>
-          </a:p>
+          <a:p/>
         </p:txBody>
       </p:sp>
       <p:sp>
@@ -3906,10 +3844,9 @@
               <a:buNone/>
             </a:pPr>
             <a:fld id="{00000000-1234-1234-1234-123412341234}" type="slidenum">
-              <a:rPr lang="en"/>
-              <a:t>‹#›</a:t>
+              <a:rPr lang="en-GB"/>
             </a:fld>
-            <a:endParaRPr/>
+            <a:endParaRPr lang="en-GB"/>
           </a:p>
         </p:txBody>
       </p:sp>
@@ -3922,7 +3859,7 @@
 </file>
 
 <file path=ppt/slideLayouts/slideLayout4.xml><?xml version="1.0" encoding="utf-8"?>
-<p:sldLayout xmlns:a="http://schemas.openxmlformats.org/drawingml/2006/main" xmlns:r="http://schemas.openxmlformats.org/officeDocument/2006/relationships" xmlns:p="http://schemas.openxmlformats.org/presentationml/2006/main" matchingName="Title and two columns" type="twoColTx">
+<p:sldLayout xmlns:a="http://schemas.openxmlformats.org/drawingml/2006/main" xmlns:r="http://schemas.openxmlformats.org/officeDocument/2006/relationships" xmlns:p="http://schemas.openxmlformats.org/presentationml/2006/main" type="twoColTx" matchingName="Title and two columns">
   <p:cSld name="TITLE_AND_TWO_COLUMNS">
     <p:spTree>
       <p:nvGrpSpPr>
@@ -4062,9 +3999,7 @@
               <a:defRPr/>
             </a:lvl9pPr>
           </a:lstStyle>
-          <a:p>
-            <a:endParaRPr/>
-          </a:p>
+          <a:p/>
         </p:txBody>
       </p:sp>
       <p:sp>
@@ -4191,9 +4126,7 @@
               <a:defRPr sz="1200"/>
             </a:lvl9pPr>
           </a:lstStyle>
-          <a:p>
-            <a:endParaRPr/>
-          </a:p>
+          <a:p/>
         </p:txBody>
       </p:sp>
       <p:sp>
@@ -4320,9 +4253,7 @@
               <a:defRPr sz="1200"/>
             </a:lvl9pPr>
           </a:lstStyle>
-          <a:p>
-            <a:endParaRPr/>
-          </a:p>
+          <a:p/>
         </p:txBody>
       </p:sp>
       <p:sp>
@@ -4433,10 +4364,9 @@
               <a:buNone/>
             </a:pPr>
             <a:fld id="{00000000-1234-1234-1234-123412341234}" type="slidenum">
-              <a:rPr lang="en"/>
-              <a:t>‹#›</a:t>
+              <a:rPr lang="en-GB"/>
             </a:fld>
-            <a:endParaRPr/>
+            <a:endParaRPr lang="en-GB"/>
           </a:p>
         </p:txBody>
       </p:sp>
@@ -4449,7 +4379,7 @@
 </file>
 
 <file path=ppt/slideLayouts/slideLayout5.xml><?xml version="1.0" encoding="utf-8"?>
-<p:sldLayout xmlns:a="http://schemas.openxmlformats.org/drawingml/2006/main" xmlns:r="http://schemas.openxmlformats.org/officeDocument/2006/relationships" xmlns:p="http://schemas.openxmlformats.org/presentationml/2006/main" matchingName="Title only" type="titleOnly">
+<p:sldLayout xmlns:a="http://schemas.openxmlformats.org/drawingml/2006/main" xmlns:r="http://schemas.openxmlformats.org/officeDocument/2006/relationships" xmlns:p="http://schemas.openxmlformats.org/presentationml/2006/main" type="titleOnly" matchingName="Title only">
   <p:cSld name="TITLE_ONLY">
     <p:spTree>
       <p:nvGrpSpPr>
@@ -4589,9 +4519,7 @@
               <a:defRPr/>
             </a:lvl9pPr>
           </a:lstStyle>
-          <a:p>
-            <a:endParaRPr/>
-          </a:p>
+          <a:p/>
         </p:txBody>
       </p:sp>
       <p:sp>
@@ -4702,10 +4630,9 @@
               <a:buNone/>
             </a:pPr>
             <a:fld id="{00000000-1234-1234-1234-123412341234}" type="slidenum">
-              <a:rPr lang="en"/>
-              <a:t>‹#›</a:t>
+              <a:rPr lang="en-GB"/>
             </a:fld>
-            <a:endParaRPr/>
+            <a:endParaRPr lang="en-GB"/>
           </a:p>
         </p:txBody>
       </p:sp>
@@ -4858,9 +4785,7 @@
               <a:defRPr sz="2400"/>
             </a:lvl9pPr>
           </a:lstStyle>
-          <a:p>
-            <a:endParaRPr/>
-          </a:p>
+          <a:p/>
         </p:txBody>
       </p:sp>
       <p:sp>
@@ -4987,9 +4912,7 @@
               <a:defRPr sz="1200"/>
             </a:lvl9pPr>
           </a:lstStyle>
-          <a:p>
-            <a:endParaRPr/>
-          </a:p>
+          <a:p/>
         </p:txBody>
       </p:sp>
       <p:sp>
@@ -5100,10 +5023,9 @@
               <a:buNone/>
             </a:pPr>
             <a:fld id="{00000000-1234-1234-1234-123412341234}" type="slidenum">
-              <a:rPr lang="en"/>
-              <a:t>‹#›</a:t>
+              <a:rPr lang="en-GB"/>
             </a:fld>
-            <a:endParaRPr/>
+            <a:endParaRPr lang="en-GB"/>
           </a:p>
         </p:txBody>
       </p:sp>
@@ -5190,7 +5112,6 @@
                 </a:spcAft>
                 <a:buNone/>
               </a:pPr>
-              <a:endParaRPr/>
             </a:p>
           </p:txBody>
         </p:sp>
@@ -5230,7 +5151,6 @@
                 </a:spcAft>
                 <a:buNone/>
               </a:pPr>
-              <a:endParaRPr/>
             </a:p>
           </p:txBody>
         </p:sp>
@@ -5270,7 +5190,6 @@
                 </a:spcAft>
                 <a:buNone/>
               </a:pPr>
-              <a:endParaRPr/>
             </a:p>
           </p:txBody>
         </p:sp>
@@ -5310,7 +5229,6 @@
                 </a:spcAft>
                 <a:buNone/>
               </a:pPr>
-              <a:endParaRPr/>
             </a:p>
           </p:txBody>
         </p:sp>
@@ -5350,7 +5268,6 @@
                 </a:spcAft>
                 <a:buNone/>
               </a:pPr>
-              <a:endParaRPr/>
             </a:p>
           </p:txBody>
         </p:sp>
@@ -5542,9 +5459,7 @@
               </a:defRPr>
             </a:lvl9pPr>
           </a:lstStyle>
-          <a:p>
-            <a:endParaRPr/>
-          </a:p>
+          <a:p/>
         </p:txBody>
       </p:sp>
       <p:sp>
@@ -5619,10 +5534,9 @@
               <a:buNone/>
             </a:pPr>
             <a:fld id="{00000000-1234-1234-1234-123412341234}" type="slidenum">
-              <a:rPr lang="en"/>
-              <a:t>‹#›</a:t>
+              <a:rPr lang="en-GB"/>
             </a:fld>
-            <a:endParaRPr/>
+            <a:endParaRPr lang="en-GB"/>
           </a:p>
         </p:txBody>
       </p:sp>
@@ -5687,7 +5601,6 @@
               </a:spcAft>
               <a:buNone/>
             </a:pPr>
-            <a:endParaRPr/>
           </a:p>
         </p:txBody>
       </p:sp>
@@ -5841,9 +5754,7 @@
               <a:defRPr sz="4200"/>
             </a:lvl9pPr>
           </a:lstStyle>
-          <a:p>
-            <a:endParaRPr/>
-          </a:p>
+          <a:p/>
         </p:txBody>
       </p:sp>
       <p:sp>
@@ -5997,9 +5908,7 @@
               <a:defRPr sz="2100"/>
             </a:lvl9pPr>
           </a:lstStyle>
-          <a:p>
-            <a:endParaRPr/>
-          </a:p>
+          <a:p/>
         </p:txBody>
       </p:sp>
       <p:sp>
@@ -6189,9 +6098,7 @@
               </a:defRPr>
             </a:lvl9pPr>
           </a:lstStyle>
-          <a:p>
-            <a:endParaRPr/>
-          </a:p>
+          <a:p/>
         </p:txBody>
       </p:sp>
       <p:sp>
@@ -6266,10 +6173,9 @@
               <a:buNone/>
             </a:pPr>
             <a:fld id="{00000000-1234-1234-1234-123412341234}" type="slidenum">
-              <a:rPr lang="en"/>
-              <a:t>‹#›</a:t>
+              <a:rPr lang="en-GB"/>
             </a:fld>
-            <a:endParaRPr/>
+            <a:endParaRPr lang="en-GB"/>
           </a:p>
         </p:txBody>
       </p:sp>
@@ -6337,9 +6243,7 @@
               <a:defRPr/>
             </a:lvl1pPr>
           </a:lstStyle>
-          <a:p>
-            <a:endParaRPr/>
-          </a:p>
+          <a:p/>
         </p:txBody>
       </p:sp>
       <p:sp>
@@ -6450,10 +6354,9 @@
               <a:buNone/>
             </a:pPr>
             <a:fld id="{00000000-1234-1234-1234-123412341234}" type="slidenum">
-              <a:rPr lang="en"/>
-              <a:t>‹#›</a:t>
+              <a:rPr lang="en-GB"/>
             </a:fld>
-            <a:endParaRPr/>
+            <a:endParaRPr lang="en-GB"/>
           </a:p>
         </p:txBody>
       </p:sp>
@@ -6467,7 +6370,7 @@
 
 <file path=ppt/slideMasters/slideMaster1.xml><?xml version="1.0" encoding="utf-8"?>
 <p:sldMaster xmlns:a="http://schemas.openxmlformats.org/drawingml/2006/main" xmlns:r="http://schemas.openxmlformats.org/officeDocument/2006/relationships" xmlns:p="http://schemas.openxmlformats.org/presentationml/2006/main">
-  <p:cSld name="geometric">
+  <p:cSld>
     <p:bg>
       <p:bgPr>
         <a:solidFill>
@@ -6529,16 +6432,16 @@
                 <a:schemeClr val="dk1"/>
               </a:buClr>
               <a:buSzPts val="3000"/>
-              <a:buFont typeface="Roboto"/>
+              <a:buFont typeface="Roboto" panose="02000000000000000000"/>
               <a:buNone/>
               <a:defRPr sz="3000">
                 <a:solidFill>
                   <a:schemeClr val="dk1"/>
                 </a:solidFill>
-                <a:latin typeface="Roboto"/>
-                <a:ea typeface="Roboto"/>
-                <a:cs typeface="Roboto"/>
-                <a:sym typeface="Roboto"/>
+                <a:latin typeface="Roboto" panose="02000000000000000000"/>
+                <a:ea typeface="Roboto" panose="02000000000000000000"/>
+                <a:cs typeface="Roboto" panose="02000000000000000000"/>
+                <a:sym typeface="Roboto" panose="02000000000000000000"/>
               </a:defRPr>
             </a:lvl1pPr>
             <a:lvl2pPr lvl="1">
@@ -6552,16 +6455,16 @@
                 <a:schemeClr val="dk1"/>
               </a:buClr>
               <a:buSzPts val="3000"/>
-              <a:buFont typeface="Roboto"/>
+              <a:buFont typeface="Roboto" panose="02000000000000000000"/>
               <a:buNone/>
               <a:defRPr sz="3000">
                 <a:solidFill>
                   <a:schemeClr val="dk1"/>
                 </a:solidFill>
-                <a:latin typeface="Roboto"/>
-                <a:ea typeface="Roboto"/>
-                <a:cs typeface="Roboto"/>
-                <a:sym typeface="Roboto"/>
+                <a:latin typeface="Roboto" panose="02000000000000000000"/>
+                <a:ea typeface="Roboto" panose="02000000000000000000"/>
+                <a:cs typeface="Roboto" panose="02000000000000000000"/>
+                <a:sym typeface="Roboto" panose="02000000000000000000"/>
               </a:defRPr>
             </a:lvl2pPr>
             <a:lvl3pPr lvl="2">
@@ -6575,16 +6478,16 @@
                 <a:schemeClr val="dk1"/>
               </a:buClr>
               <a:buSzPts val="3000"/>
-              <a:buFont typeface="Roboto"/>
+              <a:buFont typeface="Roboto" panose="02000000000000000000"/>
               <a:buNone/>
               <a:defRPr sz="3000">
                 <a:solidFill>
                   <a:schemeClr val="dk1"/>
                 </a:solidFill>
-                <a:latin typeface="Roboto"/>
-                <a:ea typeface="Roboto"/>
-                <a:cs typeface="Roboto"/>
-                <a:sym typeface="Roboto"/>
+                <a:latin typeface="Roboto" panose="02000000000000000000"/>
+                <a:ea typeface="Roboto" panose="02000000000000000000"/>
+                <a:cs typeface="Roboto" panose="02000000000000000000"/>
+                <a:sym typeface="Roboto" panose="02000000000000000000"/>
               </a:defRPr>
             </a:lvl3pPr>
             <a:lvl4pPr lvl="3">
@@ -6598,16 +6501,16 @@
                 <a:schemeClr val="dk1"/>
               </a:buClr>
               <a:buSzPts val="3000"/>
-              <a:buFont typeface="Roboto"/>
+              <a:buFont typeface="Roboto" panose="02000000000000000000"/>
               <a:buNone/>
               <a:defRPr sz="3000">
                 <a:solidFill>
                   <a:schemeClr val="dk1"/>
                 </a:solidFill>
-                <a:latin typeface="Roboto"/>
-                <a:ea typeface="Roboto"/>
-                <a:cs typeface="Roboto"/>
-                <a:sym typeface="Roboto"/>
+                <a:latin typeface="Roboto" panose="02000000000000000000"/>
+                <a:ea typeface="Roboto" panose="02000000000000000000"/>
+                <a:cs typeface="Roboto" panose="02000000000000000000"/>
+                <a:sym typeface="Roboto" panose="02000000000000000000"/>
               </a:defRPr>
             </a:lvl4pPr>
             <a:lvl5pPr lvl="4">
@@ -6621,16 +6524,16 @@
                 <a:schemeClr val="dk1"/>
               </a:buClr>
               <a:buSzPts val="3000"/>
-              <a:buFont typeface="Roboto"/>
+              <a:buFont typeface="Roboto" panose="02000000000000000000"/>
               <a:buNone/>
               <a:defRPr sz="3000">
                 <a:solidFill>
                   <a:schemeClr val="dk1"/>
                 </a:solidFill>
-                <a:latin typeface="Roboto"/>
-                <a:ea typeface="Roboto"/>
-                <a:cs typeface="Roboto"/>
-                <a:sym typeface="Roboto"/>
+                <a:latin typeface="Roboto" panose="02000000000000000000"/>
+                <a:ea typeface="Roboto" panose="02000000000000000000"/>
+                <a:cs typeface="Roboto" panose="02000000000000000000"/>
+                <a:sym typeface="Roboto" panose="02000000000000000000"/>
               </a:defRPr>
             </a:lvl5pPr>
             <a:lvl6pPr lvl="5">
@@ -6644,16 +6547,16 @@
                 <a:schemeClr val="dk1"/>
               </a:buClr>
               <a:buSzPts val="3000"/>
-              <a:buFont typeface="Roboto"/>
+              <a:buFont typeface="Roboto" panose="02000000000000000000"/>
               <a:buNone/>
               <a:defRPr sz="3000">
                 <a:solidFill>
                   <a:schemeClr val="dk1"/>
                 </a:solidFill>
-                <a:latin typeface="Roboto"/>
-                <a:ea typeface="Roboto"/>
-                <a:cs typeface="Roboto"/>
-                <a:sym typeface="Roboto"/>
+                <a:latin typeface="Roboto" panose="02000000000000000000"/>
+                <a:ea typeface="Roboto" panose="02000000000000000000"/>
+                <a:cs typeface="Roboto" panose="02000000000000000000"/>
+                <a:sym typeface="Roboto" panose="02000000000000000000"/>
               </a:defRPr>
             </a:lvl6pPr>
             <a:lvl7pPr lvl="6">
@@ -6667,16 +6570,16 @@
                 <a:schemeClr val="dk1"/>
               </a:buClr>
               <a:buSzPts val="3000"/>
-              <a:buFont typeface="Roboto"/>
+              <a:buFont typeface="Roboto" panose="02000000000000000000"/>
               <a:buNone/>
               <a:defRPr sz="3000">
                 <a:solidFill>
                   <a:schemeClr val="dk1"/>
                 </a:solidFill>
-                <a:latin typeface="Roboto"/>
-                <a:ea typeface="Roboto"/>
-                <a:cs typeface="Roboto"/>
-                <a:sym typeface="Roboto"/>
+                <a:latin typeface="Roboto" panose="02000000000000000000"/>
+                <a:ea typeface="Roboto" panose="02000000000000000000"/>
+                <a:cs typeface="Roboto" panose="02000000000000000000"/>
+                <a:sym typeface="Roboto" panose="02000000000000000000"/>
               </a:defRPr>
             </a:lvl7pPr>
             <a:lvl8pPr lvl="7">
@@ -6690,16 +6593,16 @@
                 <a:schemeClr val="dk1"/>
               </a:buClr>
               <a:buSzPts val="3000"/>
-              <a:buFont typeface="Roboto"/>
+              <a:buFont typeface="Roboto" panose="02000000000000000000"/>
               <a:buNone/>
               <a:defRPr sz="3000">
                 <a:solidFill>
                   <a:schemeClr val="dk1"/>
                 </a:solidFill>
-                <a:latin typeface="Roboto"/>
-                <a:ea typeface="Roboto"/>
-                <a:cs typeface="Roboto"/>
-                <a:sym typeface="Roboto"/>
+                <a:latin typeface="Roboto" panose="02000000000000000000"/>
+                <a:ea typeface="Roboto" panose="02000000000000000000"/>
+                <a:cs typeface="Roboto" panose="02000000000000000000"/>
+                <a:sym typeface="Roboto" panose="02000000000000000000"/>
               </a:defRPr>
             </a:lvl8pPr>
             <a:lvl9pPr lvl="8">
@@ -6713,22 +6616,20 @@
                 <a:schemeClr val="dk1"/>
               </a:buClr>
               <a:buSzPts val="3000"/>
-              <a:buFont typeface="Roboto"/>
+              <a:buFont typeface="Roboto" panose="02000000000000000000"/>
               <a:buNone/>
               <a:defRPr sz="3000">
                 <a:solidFill>
                   <a:schemeClr val="dk1"/>
                 </a:solidFill>
-                <a:latin typeface="Roboto"/>
-                <a:ea typeface="Roboto"/>
-                <a:cs typeface="Roboto"/>
-                <a:sym typeface="Roboto"/>
+                <a:latin typeface="Roboto" panose="02000000000000000000"/>
+                <a:ea typeface="Roboto" panose="02000000000000000000"/>
+                <a:cs typeface="Roboto" panose="02000000000000000000"/>
+                <a:sym typeface="Roboto" panose="02000000000000000000"/>
               </a:defRPr>
             </a:lvl9pPr>
           </a:lstStyle>
-          <a:p>
-            <a:endParaRPr/>
-          </a:p>
+          <a:p/>
         </p:txBody>
       </p:sp>
       <p:sp>
@@ -6773,16 +6674,16 @@
                 <a:schemeClr val="dk2"/>
               </a:buClr>
               <a:buSzPts val="1800"/>
-              <a:buFont typeface="Roboto"/>
+              <a:buFont typeface="Roboto" panose="02000000000000000000"/>
               <a:buChar char="●"/>
               <a:defRPr sz="1800">
                 <a:solidFill>
                   <a:schemeClr val="dk2"/>
                 </a:solidFill>
-                <a:latin typeface="Roboto"/>
-                <a:ea typeface="Roboto"/>
-                <a:cs typeface="Roboto"/>
-                <a:sym typeface="Roboto"/>
+                <a:latin typeface="Roboto" panose="02000000000000000000"/>
+                <a:ea typeface="Roboto" panose="02000000000000000000"/>
+                <a:cs typeface="Roboto" panose="02000000000000000000"/>
+                <a:sym typeface="Roboto" panose="02000000000000000000"/>
               </a:defRPr>
             </a:lvl1pPr>
             <a:lvl2pPr marL="914400" lvl="1" indent="-317500">
@@ -6799,16 +6700,16 @@
                 <a:schemeClr val="dk2"/>
               </a:buClr>
               <a:buSzPts val="1400"/>
-              <a:buFont typeface="Roboto"/>
+              <a:buFont typeface="Roboto" panose="02000000000000000000"/>
               <a:buChar char="○"/>
               <a:defRPr>
                 <a:solidFill>
                   <a:schemeClr val="dk2"/>
                 </a:solidFill>
-                <a:latin typeface="Roboto"/>
-                <a:ea typeface="Roboto"/>
-                <a:cs typeface="Roboto"/>
-                <a:sym typeface="Roboto"/>
+                <a:latin typeface="Roboto" panose="02000000000000000000"/>
+                <a:ea typeface="Roboto" panose="02000000000000000000"/>
+                <a:cs typeface="Roboto" panose="02000000000000000000"/>
+                <a:sym typeface="Roboto" panose="02000000000000000000"/>
               </a:defRPr>
             </a:lvl2pPr>
             <a:lvl3pPr marL="1371600" lvl="2" indent="-317500">
@@ -6825,16 +6726,16 @@
                 <a:schemeClr val="dk2"/>
               </a:buClr>
               <a:buSzPts val="1400"/>
-              <a:buFont typeface="Roboto"/>
+              <a:buFont typeface="Roboto" panose="02000000000000000000"/>
               <a:buChar char="■"/>
               <a:defRPr>
                 <a:solidFill>
                   <a:schemeClr val="dk2"/>
                 </a:solidFill>
-                <a:latin typeface="Roboto"/>
-                <a:ea typeface="Roboto"/>
-                <a:cs typeface="Roboto"/>
-                <a:sym typeface="Roboto"/>
+                <a:latin typeface="Roboto" panose="02000000000000000000"/>
+                <a:ea typeface="Roboto" panose="02000000000000000000"/>
+                <a:cs typeface="Roboto" panose="02000000000000000000"/>
+                <a:sym typeface="Roboto" panose="02000000000000000000"/>
               </a:defRPr>
             </a:lvl3pPr>
             <a:lvl4pPr marL="1828800" lvl="3" indent="-317500">
@@ -6851,16 +6752,16 @@
                 <a:schemeClr val="dk2"/>
               </a:buClr>
               <a:buSzPts val="1400"/>
-              <a:buFont typeface="Roboto"/>
+              <a:buFont typeface="Roboto" panose="02000000000000000000"/>
               <a:buChar char="●"/>
               <a:defRPr>
                 <a:solidFill>
                   <a:schemeClr val="dk2"/>
                 </a:solidFill>
-                <a:latin typeface="Roboto"/>
-                <a:ea typeface="Roboto"/>
-                <a:cs typeface="Roboto"/>
-                <a:sym typeface="Roboto"/>
+                <a:latin typeface="Roboto" panose="02000000000000000000"/>
+                <a:ea typeface="Roboto" panose="02000000000000000000"/>
+                <a:cs typeface="Roboto" panose="02000000000000000000"/>
+                <a:sym typeface="Roboto" panose="02000000000000000000"/>
               </a:defRPr>
             </a:lvl4pPr>
             <a:lvl5pPr marL="2286000" lvl="4" indent="-317500">
@@ -6877,16 +6778,16 @@
                 <a:schemeClr val="dk2"/>
               </a:buClr>
               <a:buSzPts val="1400"/>
-              <a:buFont typeface="Roboto"/>
+              <a:buFont typeface="Roboto" panose="02000000000000000000"/>
               <a:buChar char="○"/>
               <a:defRPr>
                 <a:solidFill>
                   <a:schemeClr val="dk2"/>
                 </a:solidFill>
-                <a:latin typeface="Roboto"/>
-                <a:ea typeface="Roboto"/>
-                <a:cs typeface="Roboto"/>
-                <a:sym typeface="Roboto"/>
+                <a:latin typeface="Roboto" panose="02000000000000000000"/>
+                <a:ea typeface="Roboto" panose="02000000000000000000"/>
+                <a:cs typeface="Roboto" panose="02000000000000000000"/>
+                <a:sym typeface="Roboto" panose="02000000000000000000"/>
               </a:defRPr>
             </a:lvl5pPr>
             <a:lvl6pPr marL="2743200" lvl="5" indent="-317500">
@@ -6903,16 +6804,16 @@
                 <a:schemeClr val="dk2"/>
               </a:buClr>
               <a:buSzPts val="1400"/>
-              <a:buFont typeface="Roboto"/>
+              <a:buFont typeface="Roboto" panose="02000000000000000000"/>
               <a:buChar char="■"/>
               <a:defRPr>
                 <a:solidFill>
                   <a:schemeClr val="dk2"/>
                 </a:solidFill>
-                <a:latin typeface="Roboto"/>
-                <a:ea typeface="Roboto"/>
-                <a:cs typeface="Roboto"/>
-                <a:sym typeface="Roboto"/>
+                <a:latin typeface="Roboto" panose="02000000000000000000"/>
+                <a:ea typeface="Roboto" panose="02000000000000000000"/>
+                <a:cs typeface="Roboto" panose="02000000000000000000"/>
+                <a:sym typeface="Roboto" panose="02000000000000000000"/>
               </a:defRPr>
             </a:lvl6pPr>
             <a:lvl7pPr marL="3200400" lvl="6" indent="-317500">
@@ -6929,16 +6830,16 @@
                 <a:schemeClr val="dk2"/>
               </a:buClr>
               <a:buSzPts val="1400"/>
-              <a:buFont typeface="Roboto"/>
+              <a:buFont typeface="Roboto" panose="02000000000000000000"/>
               <a:buChar char="●"/>
               <a:defRPr>
                 <a:solidFill>
                   <a:schemeClr val="dk2"/>
                 </a:solidFill>
-                <a:latin typeface="Roboto"/>
-                <a:ea typeface="Roboto"/>
-                <a:cs typeface="Roboto"/>
-                <a:sym typeface="Roboto"/>
+                <a:latin typeface="Roboto" panose="02000000000000000000"/>
+                <a:ea typeface="Roboto" panose="02000000000000000000"/>
+                <a:cs typeface="Roboto" panose="02000000000000000000"/>
+                <a:sym typeface="Roboto" panose="02000000000000000000"/>
               </a:defRPr>
             </a:lvl7pPr>
             <a:lvl8pPr marL="3657600" lvl="7" indent="-317500">
@@ -6955,16 +6856,16 @@
                 <a:schemeClr val="dk2"/>
               </a:buClr>
               <a:buSzPts val="1400"/>
-              <a:buFont typeface="Roboto"/>
+              <a:buFont typeface="Roboto" panose="02000000000000000000"/>
               <a:buChar char="○"/>
               <a:defRPr>
                 <a:solidFill>
                   <a:schemeClr val="dk2"/>
                 </a:solidFill>
-                <a:latin typeface="Roboto"/>
-                <a:ea typeface="Roboto"/>
-                <a:cs typeface="Roboto"/>
-                <a:sym typeface="Roboto"/>
+                <a:latin typeface="Roboto" panose="02000000000000000000"/>
+                <a:ea typeface="Roboto" panose="02000000000000000000"/>
+                <a:cs typeface="Roboto" panose="02000000000000000000"/>
+                <a:sym typeface="Roboto" panose="02000000000000000000"/>
               </a:defRPr>
             </a:lvl8pPr>
             <a:lvl9pPr marL="4114800" lvl="8" indent="-317500">
@@ -6981,22 +6882,20 @@
                 <a:schemeClr val="dk2"/>
               </a:buClr>
               <a:buSzPts val="1400"/>
-              <a:buFont typeface="Roboto"/>
+              <a:buFont typeface="Roboto" panose="02000000000000000000"/>
               <a:buChar char="■"/>
               <a:defRPr>
                 <a:solidFill>
                   <a:schemeClr val="dk2"/>
                 </a:solidFill>
-                <a:latin typeface="Roboto"/>
-                <a:ea typeface="Roboto"/>
-                <a:cs typeface="Roboto"/>
-                <a:sym typeface="Roboto"/>
+                <a:latin typeface="Roboto" panose="02000000000000000000"/>
+                <a:ea typeface="Roboto" panose="02000000000000000000"/>
+                <a:cs typeface="Roboto" panose="02000000000000000000"/>
+                <a:sym typeface="Roboto" panose="02000000000000000000"/>
               </a:defRPr>
             </a:lvl9pPr>
           </a:lstStyle>
-          <a:p>
-            <a:endParaRPr/>
-          </a:p>
+          <a:p/>
         </p:txBody>
       </p:sp>
       <p:sp>
@@ -7033,10 +6932,10 @@
                 <a:solidFill>
                   <a:schemeClr val="lt1"/>
                 </a:solidFill>
-                <a:latin typeface="Roboto"/>
-                <a:ea typeface="Roboto"/>
-                <a:cs typeface="Roboto"/>
-                <a:sym typeface="Roboto"/>
+                <a:latin typeface="Roboto" panose="02000000000000000000"/>
+                <a:ea typeface="Roboto" panose="02000000000000000000"/>
+                <a:cs typeface="Roboto" panose="02000000000000000000"/>
+                <a:sym typeface="Roboto" panose="02000000000000000000"/>
               </a:defRPr>
             </a:lvl1pPr>
             <a:lvl2pPr lvl="1" algn="r">
@@ -7045,10 +6944,10 @@
                 <a:solidFill>
                   <a:schemeClr val="lt1"/>
                 </a:solidFill>
-                <a:latin typeface="Roboto"/>
-                <a:ea typeface="Roboto"/>
-                <a:cs typeface="Roboto"/>
-                <a:sym typeface="Roboto"/>
+                <a:latin typeface="Roboto" panose="02000000000000000000"/>
+                <a:ea typeface="Roboto" panose="02000000000000000000"/>
+                <a:cs typeface="Roboto" panose="02000000000000000000"/>
+                <a:sym typeface="Roboto" panose="02000000000000000000"/>
               </a:defRPr>
             </a:lvl2pPr>
             <a:lvl3pPr lvl="2" algn="r">
@@ -7057,10 +6956,10 @@
                 <a:solidFill>
                   <a:schemeClr val="lt1"/>
                 </a:solidFill>
-                <a:latin typeface="Roboto"/>
-                <a:ea typeface="Roboto"/>
-                <a:cs typeface="Roboto"/>
-                <a:sym typeface="Roboto"/>
+                <a:latin typeface="Roboto" panose="02000000000000000000"/>
+                <a:ea typeface="Roboto" panose="02000000000000000000"/>
+                <a:cs typeface="Roboto" panose="02000000000000000000"/>
+                <a:sym typeface="Roboto" panose="02000000000000000000"/>
               </a:defRPr>
             </a:lvl3pPr>
             <a:lvl4pPr lvl="3" algn="r">
@@ -7069,10 +6968,10 @@
                 <a:solidFill>
                   <a:schemeClr val="lt1"/>
                 </a:solidFill>
-                <a:latin typeface="Roboto"/>
-                <a:ea typeface="Roboto"/>
-                <a:cs typeface="Roboto"/>
-                <a:sym typeface="Roboto"/>
+                <a:latin typeface="Roboto" panose="02000000000000000000"/>
+                <a:ea typeface="Roboto" panose="02000000000000000000"/>
+                <a:cs typeface="Roboto" panose="02000000000000000000"/>
+                <a:sym typeface="Roboto" panose="02000000000000000000"/>
               </a:defRPr>
             </a:lvl4pPr>
             <a:lvl5pPr lvl="4" algn="r">
@@ -7081,10 +6980,10 @@
                 <a:solidFill>
                   <a:schemeClr val="lt1"/>
                 </a:solidFill>
-                <a:latin typeface="Roboto"/>
-                <a:ea typeface="Roboto"/>
-                <a:cs typeface="Roboto"/>
-                <a:sym typeface="Roboto"/>
+                <a:latin typeface="Roboto" panose="02000000000000000000"/>
+                <a:ea typeface="Roboto" panose="02000000000000000000"/>
+                <a:cs typeface="Roboto" panose="02000000000000000000"/>
+                <a:sym typeface="Roboto" panose="02000000000000000000"/>
               </a:defRPr>
             </a:lvl5pPr>
             <a:lvl6pPr lvl="5" algn="r">
@@ -7093,10 +6992,10 @@
                 <a:solidFill>
                   <a:schemeClr val="lt1"/>
                 </a:solidFill>
-                <a:latin typeface="Roboto"/>
-                <a:ea typeface="Roboto"/>
-                <a:cs typeface="Roboto"/>
-                <a:sym typeface="Roboto"/>
+                <a:latin typeface="Roboto" panose="02000000000000000000"/>
+                <a:ea typeface="Roboto" panose="02000000000000000000"/>
+                <a:cs typeface="Roboto" panose="02000000000000000000"/>
+                <a:sym typeface="Roboto" panose="02000000000000000000"/>
               </a:defRPr>
             </a:lvl6pPr>
             <a:lvl7pPr lvl="6" algn="r">
@@ -7105,10 +7004,10 @@
                 <a:solidFill>
                   <a:schemeClr val="lt1"/>
                 </a:solidFill>
-                <a:latin typeface="Roboto"/>
-                <a:ea typeface="Roboto"/>
-                <a:cs typeface="Roboto"/>
-                <a:sym typeface="Roboto"/>
+                <a:latin typeface="Roboto" panose="02000000000000000000"/>
+                <a:ea typeface="Roboto" panose="02000000000000000000"/>
+                <a:cs typeface="Roboto" panose="02000000000000000000"/>
+                <a:sym typeface="Roboto" panose="02000000000000000000"/>
               </a:defRPr>
             </a:lvl7pPr>
             <a:lvl8pPr lvl="7" algn="r">
@@ -7117,10 +7016,10 @@
                 <a:solidFill>
                   <a:schemeClr val="lt1"/>
                 </a:solidFill>
-                <a:latin typeface="Roboto"/>
-                <a:ea typeface="Roboto"/>
-                <a:cs typeface="Roboto"/>
-                <a:sym typeface="Roboto"/>
+                <a:latin typeface="Roboto" panose="02000000000000000000"/>
+                <a:ea typeface="Roboto" panose="02000000000000000000"/>
+                <a:cs typeface="Roboto" panose="02000000000000000000"/>
+                <a:sym typeface="Roboto" panose="02000000000000000000"/>
               </a:defRPr>
             </a:lvl8pPr>
             <a:lvl9pPr lvl="8" algn="r">
@@ -7129,10 +7028,10 @@
                 <a:solidFill>
                   <a:schemeClr val="lt1"/>
                 </a:solidFill>
-                <a:latin typeface="Roboto"/>
-                <a:ea typeface="Roboto"/>
-                <a:cs typeface="Roboto"/>
-                <a:sym typeface="Roboto"/>
+                <a:latin typeface="Roboto" panose="02000000000000000000"/>
+                <a:ea typeface="Roboto" panose="02000000000000000000"/>
+                <a:cs typeface="Roboto" panose="02000000000000000000"/>
+                <a:sym typeface="Roboto" panose="02000000000000000000"/>
               </a:defRPr>
             </a:lvl9pPr>
           </a:lstStyle>
@@ -7147,10 +7046,9 @@
               <a:buNone/>
             </a:pPr>
             <a:fld id="{00000000-1234-1234-1234-123412341234}" type="slidenum">
-              <a:rPr lang="en"/>
-              <a:t>‹#›</a:t>
+              <a:rPr lang="en-GB"/>
             </a:fld>
-            <a:endParaRPr/>
+            <a:endParaRPr lang="en-GB"/>
           </a:p>
         </p:txBody>
       </p:sp>
@@ -7158,17 +7056,17 @@
   </p:cSld>
   <p:clrMap bg1="lt1" tx1="dk1" bg2="dk2" tx2="lt2" accent1="accent1" accent2="accent2" accent3="accent3" accent4="accent4" accent5="accent5" accent6="accent6" hlink="hlink" folHlink="folHlink"/>
   <p:sldLayoutIdLst>
-    <p:sldLayoutId id="2147483648" r:id="rId1"/>
-    <p:sldLayoutId id="2147483649" r:id="rId2"/>
-    <p:sldLayoutId id="2147483650" r:id="rId3"/>
-    <p:sldLayoutId id="2147483651" r:id="rId4"/>
-    <p:sldLayoutId id="2147483652" r:id="rId5"/>
-    <p:sldLayoutId id="2147483653" r:id="rId6"/>
-    <p:sldLayoutId id="2147483654" r:id="rId7"/>
-    <p:sldLayoutId id="2147483655" r:id="rId8"/>
-    <p:sldLayoutId id="2147483656" r:id="rId9"/>
-    <p:sldLayoutId id="2147483657" r:id="rId10"/>
-    <p:sldLayoutId id="2147483658" r:id="rId11"/>
+    <p:sldLayoutId id="2147483649" r:id="rId1"/>
+    <p:sldLayoutId id="2147483650" r:id="rId2"/>
+    <p:sldLayoutId id="2147483651" r:id="rId3"/>
+    <p:sldLayoutId id="2147483652" r:id="rId4"/>
+    <p:sldLayoutId id="2147483653" r:id="rId5"/>
+    <p:sldLayoutId id="2147483654" r:id="rId6"/>
+    <p:sldLayoutId id="2147483655" r:id="rId7"/>
+    <p:sldLayoutId id="2147483656" r:id="rId8"/>
+    <p:sldLayoutId id="2147483657" r:id="rId9"/>
+    <p:sldLayoutId id="2147483658" r:id="rId10"/>
+    <p:sldLayoutId id="2147483659" r:id="rId11"/>
   </p:sldLayoutIdLst>
   <p:hf sldNum="0" hdr="0" ftr="0" dt="0"/>
   <p:txStyles>
@@ -7197,15 +7095,15 @@
         <a:buClr>
           <a:srgbClr val="000000"/>
         </a:buClr>
-        <a:buFont typeface="Arial"/>
+        <a:buFont typeface="Arial" panose="020B0604020202020204"/>
         <a:defRPr sz="1400" b="0" i="0" u="none" strike="noStrike" cap="none">
           <a:solidFill>
             <a:srgbClr val="000000"/>
           </a:solidFill>
-          <a:latin typeface="Arial"/>
-          <a:ea typeface="Arial"/>
-          <a:cs typeface="Arial"/>
-          <a:sym typeface="Arial"/>
+          <a:latin typeface="Arial" panose="020B0604020202020204"/>
+          <a:ea typeface="Arial" panose="020B0604020202020204"/>
+          <a:cs typeface="Arial" panose="020B0604020202020204"/>
+          <a:sym typeface="Arial" panose="020B0604020202020204"/>
         </a:defRPr>
       </a:lvl1pPr>
       <a:lvl2pPr marR="0" lvl="1" algn="l" rtl="0">
@@ -7221,15 +7119,15 @@
         <a:buClr>
           <a:srgbClr val="000000"/>
         </a:buClr>
-        <a:buFont typeface="Arial"/>
+        <a:buFont typeface="Arial" panose="020B0604020202020204"/>
         <a:defRPr sz="1400" b="0" i="0" u="none" strike="noStrike" cap="none">
           <a:solidFill>
             <a:srgbClr val="000000"/>
           </a:solidFill>
-          <a:latin typeface="Arial"/>
-          <a:ea typeface="Arial"/>
-          <a:cs typeface="Arial"/>
-          <a:sym typeface="Arial"/>
+          <a:latin typeface="Arial" panose="020B0604020202020204"/>
+          <a:ea typeface="Arial" panose="020B0604020202020204"/>
+          <a:cs typeface="Arial" panose="020B0604020202020204"/>
+          <a:sym typeface="Arial" panose="020B0604020202020204"/>
         </a:defRPr>
       </a:lvl2pPr>
       <a:lvl3pPr marR="0" lvl="2" algn="l" rtl="0">
@@ -7245,15 +7143,15 @@
         <a:buClr>
           <a:srgbClr val="000000"/>
         </a:buClr>
-        <a:buFont typeface="Arial"/>
+        <a:buFont typeface="Arial" panose="020B0604020202020204"/>
         <a:defRPr sz="1400" b="0" i="0" u="none" strike="noStrike" cap="none">
           <a:solidFill>
             <a:srgbClr val="000000"/>
           </a:solidFill>
-          <a:latin typeface="Arial"/>
-          <a:ea typeface="Arial"/>
-          <a:cs typeface="Arial"/>
-          <a:sym typeface="Arial"/>
+          <a:latin typeface="Arial" panose="020B0604020202020204"/>
+          <a:ea typeface="Arial" panose="020B0604020202020204"/>
+          <a:cs typeface="Arial" panose="020B0604020202020204"/>
+          <a:sym typeface="Arial" panose="020B0604020202020204"/>
         </a:defRPr>
       </a:lvl3pPr>
       <a:lvl4pPr marR="0" lvl="3" algn="l" rtl="0">
@@ -7269,15 +7167,15 @@
         <a:buClr>
           <a:srgbClr val="000000"/>
         </a:buClr>
-        <a:buFont typeface="Arial"/>
+        <a:buFont typeface="Arial" panose="020B0604020202020204"/>
         <a:defRPr sz="1400" b="0" i="0" u="none" strike="noStrike" cap="none">
           <a:solidFill>
             <a:srgbClr val="000000"/>
           </a:solidFill>
-          <a:latin typeface="Arial"/>
-          <a:ea typeface="Arial"/>
-          <a:cs typeface="Arial"/>
-          <a:sym typeface="Arial"/>
+          <a:latin typeface="Arial" panose="020B0604020202020204"/>
+          <a:ea typeface="Arial" panose="020B0604020202020204"/>
+          <a:cs typeface="Arial" panose="020B0604020202020204"/>
+          <a:sym typeface="Arial" panose="020B0604020202020204"/>
         </a:defRPr>
       </a:lvl4pPr>
       <a:lvl5pPr marR="0" lvl="4" algn="l" rtl="0">
@@ -7293,15 +7191,15 @@
         <a:buClr>
           <a:srgbClr val="000000"/>
         </a:buClr>
-        <a:buFont typeface="Arial"/>
+        <a:buFont typeface="Arial" panose="020B0604020202020204"/>
         <a:defRPr sz="1400" b="0" i="0" u="none" strike="noStrike" cap="none">
           <a:solidFill>
             <a:srgbClr val="000000"/>
           </a:solidFill>
-          <a:latin typeface="Arial"/>
-          <a:ea typeface="Arial"/>
-          <a:cs typeface="Arial"/>
-          <a:sym typeface="Arial"/>
+          <a:latin typeface="Arial" panose="020B0604020202020204"/>
+          <a:ea typeface="Arial" panose="020B0604020202020204"/>
+          <a:cs typeface="Arial" panose="020B0604020202020204"/>
+          <a:sym typeface="Arial" panose="020B0604020202020204"/>
         </a:defRPr>
       </a:lvl5pPr>
       <a:lvl6pPr marR="0" lvl="5" algn="l" rtl="0">
@@ -7317,15 +7215,15 @@
         <a:buClr>
           <a:srgbClr val="000000"/>
         </a:buClr>
-        <a:buFont typeface="Arial"/>
+        <a:buFont typeface="Arial" panose="020B0604020202020204"/>
         <a:defRPr sz="1400" b="0" i="0" u="none" strike="noStrike" cap="none">
           <a:solidFill>
             <a:srgbClr val="000000"/>
           </a:solidFill>
-          <a:latin typeface="Arial"/>
-          <a:ea typeface="Arial"/>
-          <a:cs typeface="Arial"/>
-          <a:sym typeface="Arial"/>
+          <a:latin typeface="Arial" panose="020B0604020202020204"/>
+          <a:ea typeface="Arial" panose="020B0604020202020204"/>
+          <a:cs typeface="Arial" panose="020B0604020202020204"/>
+          <a:sym typeface="Arial" panose="020B0604020202020204"/>
         </a:defRPr>
       </a:lvl6pPr>
       <a:lvl7pPr marR="0" lvl="6" algn="l" rtl="0">
@@ -7341,15 +7239,15 @@
         <a:buClr>
           <a:srgbClr val="000000"/>
         </a:buClr>
-        <a:buFont typeface="Arial"/>
+        <a:buFont typeface="Arial" panose="020B0604020202020204"/>
         <a:defRPr sz="1400" b="0" i="0" u="none" strike="noStrike" cap="none">
           <a:solidFill>
             <a:srgbClr val="000000"/>
           </a:solidFill>
-          <a:latin typeface="Arial"/>
-          <a:ea typeface="Arial"/>
-          <a:cs typeface="Arial"/>
-          <a:sym typeface="Arial"/>
+          <a:latin typeface="Arial" panose="020B0604020202020204"/>
+          <a:ea typeface="Arial" panose="020B0604020202020204"/>
+          <a:cs typeface="Arial" panose="020B0604020202020204"/>
+          <a:sym typeface="Arial" panose="020B0604020202020204"/>
         </a:defRPr>
       </a:lvl7pPr>
       <a:lvl8pPr marR="0" lvl="7" algn="l" rtl="0">
@@ -7365,15 +7263,15 @@
         <a:buClr>
           <a:srgbClr val="000000"/>
         </a:buClr>
-        <a:buFont typeface="Arial"/>
+        <a:buFont typeface="Arial" panose="020B0604020202020204"/>
         <a:defRPr sz="1400" b="0" i="0" u="none" strike="noStrike" cap="none">
           <a:solidFill>
             <a:srgbClr val="000000"/>
           </a:solidFill>
-          <a:latin typeface="Arial"/>
-          <a:ea typeface="Arial"/>
-          <a:cs typeface="Arial"/>
-          <a:sym typeface="Arial"/>
+          <a:latin typeface="Arial" panose="020B0604020202020204"/>
+          <a:ea typeface="Arial" panose="020B0604020202020204"/>
+          <a:cs typeface="Arial" panose="020B0604020202020204"/>
+          <a:sym typeface="Arial" panose="020B0604020202020204"/>
         </a:defRPr>
       </a:lvl8pPr>
       <a:lvl9pPr marR="0" lvl="8" algn="l" rtl="0">
@@ -7389,15 +7287,15 @@
         <a:buClr>
           <a:srgbClr val="000000"/>
         </a:buClr>
-        <a:buFont typeface="Arial"/>
+        <a:buFont typeface="Arial" panose="020B0604020202020204"/>
         <a:defRPr sz="1400" b="0" i="0" u="none" strike="noStrike" cap="none">
           <a:solidFill>
             <a:srgbClr val="000000"/>
           </a:solidFill>
-          <a:latin typeface="Arial"/>
-          <a:ea typeface="Arial"/>
-          <a:cs typeface="Arial"/>
-          <a:sym typeface="Arial"/>
+          <a:latin typeface="Arial" panose="020B0604020202020204"/>
+          <a:ea typeface="Arial" panose="020B0604020202020204"/>
+          <a:cs typeface="Arial" panose="020B0604020202020204"/>
+          <a:sym typeface="Arial" panose="020B0604020202020204"/>
         </a:defRPr>
       </a:lvl9pPr>
     </p:titleStyle>
@@ -7426,15 +7324,15 @@
         <a:buClr>
           <a:srgbClr val="000000"/>
         </a:buClr>
-        <a:buFont typeface="Arial"/>
+        <a:buFont typeface="Arial" panose="020B0604020202020204"/>
         <a:defRPr sz="1400" b="0" i="0" u="none" strike="noStrike" cap="none">
           <a:solidFill>
             <a:srgbClr val="000000"/>
           </a:solidFill>
-          <a:latin typeface="Arial"/>
-          <a:ea typeface="Arial"/>
-          <a:cs typeface="Arial"/>
-          <a:sym typeface="Arial"/>
+          <a:latin typeface="Arial" panose="020B0604020202020204"/>
+          <a:ea typeface="Arial" panose="020B0604020202020204"/>
+          <a:cs typeface="Arial" panose="020B0604020202020204"/>
+          <a:sym typeface="Arial" panose="020B0604020202020204"/>
         </a:defRPr>
       </a:lvl1pPr>
       <a:lvl2pPr marR="0" lvl="1" algn="l" rtl="0">
@@ -7450,15 +7348,15 @@
         <a:buClr>
           <a:srgbClr val="000000"/>
         </a:buClr>
-        <a:buFont typeface="Arial"/>
+        <a:buFont typeface="Arial" panose="020B0604020202020204"/>
         <a:defRPr sz="1400" b="0" i="0" u="none" strike="noStrike" cap="none">
           <a:solidFill>
             <a:srgbClr val="000000"/>
           </a:solidFill>
-          <a:latin typeface="Arial"/>
-          <a:ea typeface="Arial"/>
-          <a:cs typeface="Arial"/>
-          <a:sym typeface="Arial"/>
+          <a:latin typeface="Arial" panose="020B0604020202020204"/>
+          <a:ea typeface="Arial" panose="020B0604020202020204"/>
+          <a:cs typeface="Arial" panose="020B0604020202020204"/>
+          <a:sym typeface="Arial" panose="020B0604020202020204"/>
         </a:defRPr>
       </a:lvl2pPr>
       <a:lvl3pPr marR="0" lvl="2" algn="l" rtl="0">
@@ -7474,15 +7372,15 @@
         <a:buClr>
           <a:srgbClr val="000000"/>
         </a:buClr>
-        <a:buFont typeface="Arial"/>
+        <a:buFont typeface="Arial" panose="020B0604020202020204"/>
         <a:defRPr sz="1400" b="0" i="0" u="none" strike="noStrike" cap="none">
           <a:solidFill>
             <a:srgbClr val="000000"/>
           </a:solidFill>
-          <a:latin typeface="Arial"/>
-          <a:ea typeface="Arial"/>
-          <a:cs typeface="Arial"/>
-          <a:sym typeface="Arial"/>
+          <a:latin typeface="Arial" panose="020B0604020202020204"/>
+          <a:ea typeface="Arial" panose="020B0604020202020204"/>
+          <a:cs typeface="Arial" panose="020B0604020202020204"/>
+          <a:sym typeface="Arial" panose="020B0604020202020204"/>
         </a:defRPr>
       </a:lvl3pPr>
       <a:lvl4pPr marR="0" lvl="3" algn="l" rtl="0">
@@ -7498,15 +7396,15 @@
         <a:buClr>
           <a:srgbClr val="000000"/>
         </a:buClr>
-        <a:buFont typeface="Arial"/>
+        <a:buFont typeface="Arial" panose="020B0604020202020204"/>
         <a:defRPr sz="1400" b="0" i="0" u="none" strike="noStrike" cap="none">
           <a:solidFill>
             <a:srgbClr val="000000"/>
           </a:solidFill>
-          <a:latin typeface="Arial"/>
-          <a:ea typeface="Arial"/>
-          <a:cs typeface="Arial"/>
-          <a:sym typeface="Arial"/>
+          <a:latin typeface="Arial" panose="020B0604020202020204"/>
+          <a:ea typeface="Arial" panose="020B0604020202020204"/>
+          <a:cs typeface="Arial" panose="020B0604020202020204"/>
+          <a:sym typeface="Arial" panose="020B0604020202020204"/>
         </a:defRPr>
       </a:lvl4pPr>
       <a:lvl5pPr marR="0" lvl="4" algn="l" rtl="0">
@@ -7522,15 +7420,15 @@
         <a:buClr>
           <a:srgbClr val="000000"/>
         </a:buClr>
-        <a:buFont typeface="Arial"/>
+        <a:buFont typeface="Arial" panose="020B0604020202020204"/>
         <a:defRPr sz="1400" b="0" i="0" u="none" strike="noStrike" cap="none">
           <a:solidFill>
             <a:srgbClr val="000000"/>
           </a:solidFill>
-          <a:latin typeface="Arial"/>
-          <a:ea typeface="Arial"/>
-          <a:cs typeface="Arial"/>
-          <a:sym typeface="Arial"/>
+          <a:latin typeface="Arial" panose="020B0604020202020204"/>
+          <a:ea typeface="Arial" panose="020B0604020202020204"/>
+          <a:cs typeface="Arial" panose="020B0604020202020204"/>
+          <a:sym typeface="Arial" panose="020B0604020202020204"/>
         </a:defRPr>
       </a:lvl5pPr>
       <a:lvl6pPr marR="0" lvl="5" algn="l" rtl="0">
@@ -7546,15 +7444,15 @@
         <a:buClr>
           <a:srgbClr val="000000"/>
         </a:buClr>
-        <a:buFont typeface="Arial"/>
+        <a:buFont typeface="Arial" panose="020B0604020202020204"/>
         <a:defRPr sz="1400" b="0" i="0" u="none" strike="noStrike" cap="none">
           <a:solidFill>
             <a:srgbClr val="000000"/>
           </a:solidFill>
-          <a:latin typeface="Arial"/>
-          <a:ea typeface="Arial"/>
-          <a:cs typeface="Arial"/>
-          <a:sym typeface="Arial"/>
+          <a:latin typeface="Arial" panose="020B0604020202020204"/>
+          <a:ea typeface="Arial" panose="020B0604020202020204"/>
+          <a:cs typeface="Arial" panose="020B0604020202020204"/>
+          <a:sym typeface="Arial" panose="020B0604020202020204"/>
         </a:defRPr>
       </a:lvl6pPr>
       <a:lvl7pPr marR="0" lvl="6" algn="l" rtl="0">
@@ -7570,15 +7468,15 @@
         <a:buClr>
           <a:srgbClr val="000000"/>
         </a:buClr>
-        <a:buFont typeface="Arial"/>
+        <a:buFont typeface="Arial" panose="020B0604020202020204"/>
         <a:defRPr sz="1400" b="0" i="0" u="none" strike="noStrike" cap="none">
           <a:solidFill>
             <a:srgbClr val="000000"/>
           </a:solidFill>
-          <a:latin typeface="Arial"/>
-          <a:ea typeface="Arial"/>
-          <a:cs typeface="Arial"/>
-          <a:sym typeface="Arial"/>
+          <a:latin typeface="Arial" panose="020B0604020202020204"/>
+          <a:ea typeface="Arial" panose="020B0604020202020204"/>
+          <a:cs typeface="Arial" panose="020B0604020202020204"/>
+          <a:sym typeface="Arial" panose="020B0604020202020204"/>
         </a:defRPr>
       </a:lvl7pPr>
       <a:lvl8pPr marR="0" lvl="7" algn="l" rtl="0">
@@ -7594,15 +7492,15 @@
         <a:buClr>
           <a:srgbClr val="000000"/>
         </a:buClr>
-        <a:buFont typeface="Arial"/>
+        <a:buFont typeface="Arial" panose="020B0604020202020204"/>
         <a:defRPr sz="1400" b="0" i="0" u="none" strike="noStrike" cap="none">
           <a:solidFill>
             <a:srgbClr val="000000"/>
           </a:solidFill>
-          <a:latin typeface="Arial"/>
-          <a:ea typeface="Arial"/>
-          <a:cs typeface="Arial"/>
-          <a:sym typeface="Arial"/>
+          <a:latin typeface="Arial" panose="020B0604020202020204"/>
+          <a:ea typeface="Arial" panose="020B0604020202020204"/>
+          <a:cs typeface="Arial" panose="020B0604020202020204"/>
+          <a:sym typeface="Arial" panose="020B0604020202020204"/>
         </a:defRPr>
       </a:lvl8pPr>
       <a:lvl9pPr marR="0" lvl="8" algn="l" rtl="0">
@@ -7618,15 +7516,15 @@
         <a:buClr>
           <a:srgbClr val="000000"/>
         </a:buClr>
-        <a:buFont typeface="Arial"/>
+        <a:buFont typeface="Arial" panose="020B0604020202020204"/>
         <a:defRPr sz="1400" b="0" i="0" u="none" strike="noStrike" cap="none">
           <a:solidFill>
             <a:srgbClr val="000000"/>
           </a:solidFill>
-          <a:latin typeface="Arial"/>
-          <a:ea typeface="Arial"/>
-          <a:cs typeface="Arial"/>
-          <a:sym typeface="Arial"/>
+          <a:latin typeface="Arial" panose="020B0604020202020204"/>
+          <a:ea typeface="Arial" panose="020B0604020202020204"/>
+          <a:cs typeface="Arial" panose="020B0604020202020204"/>
+          <a:sym typeface="Arial" panose="020B0604020202020204"/>
         </a:defRPr>
       </a:lvl9pPr>
     </p:bodyStyle>
@@ -7655,15 +7553,15 @@
         <a:buClr>
           <a:srgbClr val="000000"/>
         </a:buClr>
-        <a:buFont typeface="Arial"/>
+        <a:buFont typeface="Arial" panose="020B0604020202020204"/>
         <a:defRPr sz="1400" b="0" i="0" u="none" strike="noStrike" cap="none">
           <a:solidFill>
             <a:srgbClr val="000000"/>
           </a:solidFill>
-          <a:latin typeface="Arial"/>
-          <a:ea typeface="Arial"/>
-          <a:cs typeface="Arial"/>
-          <a:sym typeface="Arial"/>
+          <a:latin typeface="Arial" panose="020B0604020202020204"/>
+          <a:ea typeface="Arial" panose="020B0604020202020204"/>
+          <a:cs typeface="Arial" panose="020B0604020202020204"/>
+          <a:sym typeface="Arial" panose="020B0604020202020204"/>
         </a:defRPr>
       </a:lvl1pPr>
       <a:lvl2pPr marR="0" lvl="1" algn="l" rtl="0">
@@ -7679,15 +7577,15 @@
         <a:buClr>
           <a:srgbClr val="000000"/>
         </a:buClr>
-        <a:buFont typeface="Arial"/>
+        <a:buFont typeface="Arial" panose="020B0604020202020204"/>
         <a:defRPr sz="1400" b="0" i="0" u="none" strike="noStrike" cap="none">
           <a:solidFill>
             <a:srgbClr val="000000"/>
           </a:solidFill>
-          <a:latin typeface="Arial"/>
-          <a:ea typeface="Arial"/>
-          <a:cs typeface="Arial"/>
-          <a:sym typeface="Arial"/>
+          <a:latin typeface="Arial" panose="020B0604020202020204"/>
+          <a:ea typeface="Arial" panose="020B0604020202020204"/>
+          <a:cs typeface="Arial" panose="020B0604020202020204"/>
+          <a:sym typeface="Arial" panose="020B0604020202020204"/>
         </a:defRPr>
       </a:lvl2pPr>
       <a:lvl3pPr marR="0" lvl="2" algn="l" rtl="0">
@@ -7703,15 +7601,15 @@
         <a:buClr>
           <a:srgbClr val="000000"/>
         </a:buClr>
-        <a:buFont typeface="Arial"/>
+        <a:buFont typeface="Arial" panose="020B0604020202020204"/>
         <a:defRPr sz="1400" b="0" i="0" u="none" strike="noStrike" cap="none">
           <a:solidFill>
             <a:srgbClr val="000000"/>
           </a:solidFill>
-          <a:latin typeface="Arial"/>
-          <a:ea typeface="Arial"/>
-          <a:cs typeface="Arial"/>
-          <a:sym typeface="Arial"/>
+          <a:latin typeface="Arial" panose="020B0604020202020204"/>
+          <a:ea typeface="Arial" panose="020B0604020202020204"/>
+          <a:cs typeface="Arial" panose="020B0604020202020204"/>
+          <a:sym typeface="Arial" panose="020B0604020202020204"/>
         </a:defRPr>
       </a:lvl3pPr>
       <a:lvl4pPr marR="0" lvl="3" algn="l" rtl="0">
@@ -7727,15 +7625,15 @@
         <a:buClr>
           <a:srgbClr val="000000"/>
         </a:buClr>
-        <a:buFont typeface="Arial"/>
+        <a:buFont typeface="Arial" panose="020B0604020202020204"/>
         <a:defRPr sz="1400" b="0" i="0" u="none" strike="noStrike" cap="none">
           <a:solidFill>
             <a:srgbClr val="000000"/>
           </a:solidFill>
-          <a:latin typeface="Arial"/>
-          <a:ea typeface="Arial"/>
-          <a:cs typeface="Arial"/>
-          <a:sym typeface="Arial"/>
+          <a:latin typeface="Arial" panose="020B0604020202020204"/>
+          <a:ea typeface="Arial" panose="020B0604020202020204"/>
+          <a:cs typeface="Arial" panose="020B0604020202020204"/>
+          <a:sym typeface="Arial" panose="020B0604020202020204"/>
         </a:defRPr>
       </a:lvl4pPr>
       <a:lvl5pPr marR="0" lvl="4" algn="l" rtl="0">
@@ -7751,15 +7649,15 @@
         <a:buClr>
           <a:srgbClr val="000000"/>
         </a:buClr>
-        <a:buFont typeface="Arial"/>
+        <a:buFont typeface="Arial" panose="020B0604020202020204"/>
         <a:defRPr sz="1400" b="0" i="0" u="none" strike="noStrike" cap="none">
           <a:solidFill>
             <a:srgbClr val="000000"/>
           </a:solidFill>
-          <a:latin typeface="Arial"/>
-          <a:ea typeface="Arial"/>
-          <a:cs typeface="Arial"/>
-          <a:sym typeface="Arial"/>
+          <a:latin typeface="Arial" panose="020B0604020202020204"/>
+          <a:ea typeface="Arial" panose="020B0604020202020204"/>
+          <a:cs typeface="Arial" panose="020B0604020202020204"/>
+          <a:sym typeface="Arial" panose="020B0604020202020204"/>
         </a:defRPr>
       </a:lvl5pPr>
       <a:lvl6pPr marR="0" lvl="5" algn="l" rtl="0">
@@ -7775,15 +7673,15 @@
         <a:buClr>
           <a:srgbClr val="000000"/>
         </a:buClr>
-        <a:buFont typeface="Arial"/>
+        <a:buFont typeface="Arial" panose="020B0604020202020204"/>
         <a:defRPr sz="1400" b="0" i="0" u="none" strike="noStrike" cap="none">
           <a:solidFill>
             <a:srgbClr val="000000"/>
           </a:solidFill>
-          <a:latin typeface="Arial"/>
-          <a:ea typeface="Arial"/>
-          <a:cs typeface="Arial"/>
-          <a:sym typeface="Arial"/>
+          <a:latin typeface="Arial" panose="020B0604020202020204"/>
+          <a:ea typeface="Arial" panose="020B0604020202020204"/>
+          <a:cs typeface="Arial" panose="020B0604020202020204"/>
+          <a:sym typeface="Arial" panose="020B0604020202020204"/>
         </a:defRPr>
       </a:lvl6pPr>
       <a:lvl7pPr marR="0" lvl="6" algn="l" rtl="0">
@@ -7799,15 +7697,15 @@
         <a:buClr>
           <a:srgbClr val="000000"/>
         </a:buClr>
-        <a:buFont typeface="Arial"/>
+        <a:buFont typeface="Arial" panose="020B0604020202020204"/>
         <a:defRPr sz="1400" b="0" i="0" u="none" strike="noStrike" cap="none">
           <a:solidFill>
             <a:srgbClr val="000000"/>
           </a:solidFill>
-          <a:latin typeface="Arial"/>
-          <a:ea typeface="Arial"/>
-          <a:cs typeface="Arial"/>
-          <a:sym typeface="Arial"/>
+          <a:latin typeface="Arial" panose="020B0604020202020204"/>
+          <a:ea typeface="Arial" panose="020B0604020202020204"/>
+          <a:cs typeface="Arial" panose="020B0604020202020204"/>
+          <a:sym typeface="Arial" panose="020B0604020202020204"/>
         </a:defRPr>
       </a:lvl7pPr>
       <a:lvl8pPr marR="0" lvl="7" algn="l" rtl="0">
@@ -7823,15 +7721,15 @@
         <a:buClr>
           <a:srgbClr val="000000"/>
         </a:buClr>
-        <a:buFont typeface="Arial"/>
+        <a:buFont typeface="Arial" panose="020B0604020202020204"/>
         <a:defRPr sz="1400" b="0" i="0" u="none" strike="noStrike" cap="none">
           <a:solidFill>
             <a:srgbClr val="000000"/>
           </a:solidFill>
-          <a:latin typeface="Arial"/>
-          <a:ea typeface="Arial"/>
-          <a:cs typeface="Arial"/>
-          <a:sym typeface="Arial"/>
+          <a:latin typeface="Arial" panose="020B0604020202020204"/>
+          <a:ea typeface="Arial" panose="020B0604020202020204"/>
+          <a:cs typeface="Arial" panose="020B0604020202020204"/>
+          <a:sym typeface="Arial" panose="020B0604020202020204"/>
         </a:defRPr>
       </a:lvl8pPr>
       <a:lvl9pPr marR="0" lvl="8" algn="l" rtl="0">
@@ -7847,15 +7745,15 @@
         <a:buClr>
           <a:srgbClr val="000000"/>
         </a:buClr>
-        <a:buFont typeface="Arial"/>
+        <a:buFont typeface="Arial" panose="020B0604020202020204"/>
         <a:defRPr sz="1400" b="0" i="0" u="none" strike="noStrike" cap="none">
           <a:solidFill>
             <a:srgbClr val="000000"/>
           </a:solidFill>
-          <a:latin typeface="Arial"/>
-          <a:ea typeface="Arial"/>
-          <a:cs typeface="Arial"/>
-          <a:sym typeface="Arial"/>
+          <a:latin typeface="Arial" panose="020B0604020202020204"/>
+          <a:ea typeface="Arial" panose="020B0604020202020204"/>
+          <a:cs typeface="Arial" panose="020B0604020202020204"/>
+          <a:sym typeface="Arial" panose="020B0604020202020204"/>
         </a:defRPr>
       </a:lvl9pPr>
     </p:otherStyle>
@@ -7914,7 +7812,6 @@
               </a:spcAft>
               <a:buNone/>
             </a:pPr>
-            <a:endParaRPr/>
           </a:p>
         </p:txBody>
       </p:sp>
@@ -7952,7 +7849,6 @@
               </a:spcAft>
               <a:buNone/>
             </a:pPr>
-            <a:endParaRPr/>
           </a:p>
         </p:txBody>
       </p:sp>
@@ -8015,7 +7911,6 @@
               </a:spcAft>
               <a:buNone/>
             </a:pPr>
-            <a:endParaRPr/>
           </a:p>
         </p:txBody>
       </p:sp>
@@ -8053,7 +7948,6 @@
               </a:spcAft>
               <a:buNone/>
             </a:pPr>
-            <a:endParaRPr/>
           </a:p>
         </p:txBody>
       </p:sp>
@@ -8116,7 +8010,23 @@
               </a:spcAft>
               <a:buNone/>
             </a:pPr>
-            <a:endParaRPr/>
+            <a:r>
+              <a:rPr sz="1800" b="1">
+                <a:solidFill>
+                  <a:srgbClr val="C00000"/>
+                </a:solidFill>
+                <a:latin typeface="+mj-ea"/>
+                <a:cs typeface="+mj-ea"/>
+              </a:rPr>
+              <a:t>Location Based Business Recommendation Using Spatial Demand</a:t>
+            </a:r>
+            <a:endParaRPr sz="1800" b="1">
+              <a:solidFill>
+                <a:srgbClr val="C00000"/>
+              </a:solidFill>
+              <a:latin typeface="+mj-ea"/>
+              <a:cs typeface="+mj-ea"/>
+            </a:endParaRPr>
           </a:p>
         </p:txBody>
       </p:sp>
@@ -8132,7 +8042,7 @@
         </p:nvSpPr>
         <p:spPr>
           <a:xfrm>
-            <a:off x="311700" y="1229875"/>
+            <a:off x="311700" y="902215"/>
             <a:ext cx="8520600" cy="3339000"/>
           </a:xfrm>
           <a:prstGeom prst="rect">
@@ -8154,7 +8064,161 @@
               </a:spcAft>
               <a:buNone/>
             </a:pPr>
-            <a:endParaRPr/>
+            <a:r>
+              <a:rPr sz="1600"/>
+              <a:t> </a:t>
+            </a:r>
+            <a:r>
+              <a:rPr lang="en-IN" sz="1600"/>
+              <a:t>Great use for enterprenures to get a perfect area and number of customers who   need for the service .</a:t>
+            </a:r>
+            <a:endParaRPr lang="en-IN" sz="1600"/>
+          </a:p>
+          <a:p>
+            <a:pPr marL="0" lvl="0" indent="0" algn="l" rtl="0">
+              <a:spcBef>
+                <a:spcPts val="0"/>
+              </a:spcBef>
+              <a:spcAft>
+                <a:spcPts val="1600"/>
+              </a:spcAft>
+              <a:buNone/>
+            </a:pPr>
+            <a:endParaRPr lang="en-IN" sz="1600"/>
+          </a:p>
+          <a:p>
+            <a:pPr marL="0" lvl="0" indent="0" algn="l" rtl="0">
+              <a:spcBef>
+                <a:spcPts val="0"/>
+              </a:spcBef>
+              <a:spcAft>
+                <a:spcPts val="1600"/>
+              </a:spcAft>
+              <a:buNone/>
+            </a:pPr>
+            <a:r>
+              <a:rPr lang="en-IN" b="1">
+                <a:solidFill>
+                  <a:srgbClr val="C00000"/>
+                </a:solidFill>
+                <a:latin typeface="+mj-ea"/>
+                <a:cs typeface="+mj-ea"/>
+              </a:rPr>
+              <a:t>Predicting the match winner</a:t>
+            </a:r>
+            <a:endParaRPr lang="en-IN" b="1">
+              <a:solidFill>
+                <a:srgbClr val="C00000"/>
+              </a:solidFill>
+              <a:latin typeface="+mj-ea"/>
+              <a:cs typeface="+mj-ea"/>
+            </a:endParaRPr>
+          </a:p>
+          <a:p>
+            <a:pPr marL="0" lvl="0" indent="0" algn="l" rtl="0">
+              <a:spcBef>
+                <a:spcPts val="0"/>
+              </a:spcBef>
+              <a:spcAft>
+                <a:spcPts val="1600"/>
+              </a:spcAft>
+              <a:buNone/>
+            </a:pPr>
+            <a:r>
+              <a:rPr lang="en-IN" sz="1000">
+                <a:solidFill>
+                  <a:schemeClr val="tx1"/>
+                </a:solidFill>
+              </a:rPr>
+              <a:t>https://blog.coast.ai/this-is-how-i-used-machine-learning-to-accurately-predict-villanova-to-win-the-2016-march-madness-ba5c074f1583#.e6xllp64p</a:t>
+            </a:r>
+            <a:endParaRPr lang="en-IN" sz="1000">
+              <a:solidFill>
+                <a:schemeClr val="tx1"/>
+              </a:solidFill>
+            </a:endParaRPr>
+          </a:p>
+        </p:txBody>
+      </p:sp>
+      <p:graphicFrame>
+        <p:nvGraphicFramePr>
+          <p:cNvPr id="2" name="Object 1">
+            <a:hlinkClick r:id="" action="ppaction://ole?verb="/>
+          </p:cNvPr>
+          <p:cNvGraphicFramePr>
+            <a:graphicFrameLocks noChangeAspect="1"/>
+          </p:cNvGraphicFramePr>
+          <p:nvPr/>
+        </p:nvGraphicFramePr>
+        <p:xfrm>
+          <a:off x="1798320" y="1624330"/>
+          <a:ext cx="387985" cy="486410"/>
+        </p:xfrm>
+        <a:graphic>
+          <a:graphicData uri="http://schemas.openxmlformats.org/presentationml/2006/ole">
+            <mc:AlternateContent xmlns:mc="http://schemas.openxmlformats.org/markup-compatibility/2006">
+              <mc:Choice xmlns:v="urn:schemas-microsoft-com:vml" Requires="v">
+                <p:oleObj spid="_x0000_s1025" name="" r:id="rId1" imgW="387985" imgH="486410" progId="Package">
+                  <p:embed/>
+                </p:oleObj>
+              </mc:Choice>
+              <mc:Fallback>
+                <p:oleObj name="" r:id="rId1" imgW="387985" imgH="486410" progId="Package">
+                  <p:embed/>
+                  <p:pic>
+                    <p:nvPicPr>
+                      <p:cNvPr id="0" name="Picture 1024"/>
+                      <p:cNvPicPr/>
+                      <p:nvPr/>
+                    </p:nvPicPr>
+                    <p:blipFill>
+                      <a:blip r:embed="rId2"/>
+                      <a:stretch>
+                        <a:fillRect/>
+                      </a:stretch>
+                    </p:blipFill>
+                    <p:spPr>
+                      <a:xfrm>
+                        <a:off x="1798320" y="1624330"/>
+                        <a:ext cx="387985" cy="486410"/>
+                      </a:xfrm>
+                      <a:prstGeom prst="rect">
+                        <a:avLst/>
+                      </a:prstGeom>
+                    </p:spPr>
+                  </p:pic>
+                </p:oleObj>
+              </mc:Fallback>
+            </mc:AlternateContent>
+          </a:graphicData>
+        </a:graphic>
+      </p:graphicFrame>
+      <p:sp>
+        <p:nvSpPr>
+          <p:cNvPr id="3" name="Text Box 2"/>
+          <p:cNvSpPr txBox="1"/>
+          <p:nvPr/>
+        </p:nvSpPr>
+        <p:spPr>
+          <a:xfrm>
+            <a:off x="6652895" y="4241165"/>
+            <a:ext cx="2023110" cy="337185"/>
+          </a:xfrm>
+          <a:prstGeom prst="rect">
+            <a:avLst/>
+          </a:prstGeom>
+          <a:noFill/>
+        </p:spPr>
+        <p:txBody>
+          <a:bodyPr wrap="none" rtlCol="0">
+            <a:spAutoFit/>
+          </a:bodyPr>
+          <a:p>
+            <a:r>
+              <a:rPr lang="en-IN" altLang="en-US" sz="1600" b="1"/>
+              <a:t>Madhurika Ganiger</a:t>
+            </a:r>
+            <a:endParaRPr lang="en-IN" altLang="en-US" sz="1600" b="1"/>
           </a:p>
         </p:txBody>
       </p:sp>
@@ -8217,7 +8281,6 @@
               </a:spcAft>
               <a:buNone/>
             </a:pPr>
-            <a:endParaRPr/>
           </a:p>
         </p:txBody>
       </p:sp>
@@ -8255,7 +8318,6 @@
               </a:spcAft>
               <a:buNone/>
             </a:pPr>
-            <a:endParaRPr/>
           </a:p>
         </p:txBody>
       </p:sp>
@@ -8494,20 +8556,14 @@
       </p:sp>
       <p:pic>
         <p:nvPicPr>
-          <p:cNvPr id="3" name="Picture 2">
-            <a:extLst>
-              <a:ext uri="{FF2B5EF4-FFF2-40B4-BE49-F238E27FC236}">
-                <a16:creationId xmlns:a16="http://schemas.microsoft.com/office/drawing/2014/main" id="{3BBDA7E5-3274-4D0B-9DAF-BC91129DB421}"/>
-              </a:ext>
-            </a:extLst>
-          </p:cNvPr>
+          <p:cNvPr id="3" name="Picture 2"/>
           <p:cNvPicPr>
             <a:picLocks noChangeAspect="1"/>
           </p:cNvPicPr>
           <p:nvPr/>
         </p:nvPicPr>
         <p:blipFill>
-          <a:blip r:embed="rId3"/>
+          <a:blip r:embed="rId1"/>
           <a:stretch>
             <a:fillRect/>
           </a:stretch>
@@ -8524,13 +8580,7 @@
       </p:pic>
       <p:sp>
         <p:nvSpPr>
-          <p:cNvPr id="4" name="TextBox 3">
-            <a:extLst>
-              <a:ext uri="{FF2B5EF4-FFF2-40B4-BE49-F238E27FC236}">
-                <a16:creationId xmlns:a16="http://schemas.microsoft.com/office/drawing/2014/main" id="{2D913684-7F32-4741-8835-72DFDFDEB36A}"/>
-              </a:ext>
-            </a:extLst>
-          </p:cNvPr>
+          <p:cNvPr id="4" name="TextBox 3"/>
           <p:cNvSpPr txBox="1"/>
           <p:nvPr/>
         </p:nvSpPr>
@@ -8554,6 +8604,7 @@
               <a:rPr lang="en-IN" dirty="0"/>
               <a:t>Abhishek rao</a:t>
             </a:r>
+            <a:endParaRPr lang="en-IN" dirty="0"/>
           </a:p>
         </p:txBody>
       </p:sp>
@@ -8841,8 +8892,11 @@
       </a:bgFillStyleLst>
     </a:fmtScheme>
   </a:themeElements>
-  <a:objectDefaults/>
-  <a:extraClrSchemeLst/>
+  <a:extLst>
+    <a:ext uri="{05A4C25C-085E-4340-85A3-A5531E510DB2}">
+      <thm15:themeFamily xmlns:thm15="http://schemas.microsoft.com/office/thememl/2012/main" name="Office Theme" id="{62F939B6-93AF-4DB8-9C6B-D6C7DFDC589F}" vid="{4A3C46E8-61CC-4603-A589-7422A47A8E4A}"/>
+    </a:ext>
+  </a:extLst>
 </a:theme>
 </file>
 
@@ -9122,7 +9176,10 @@
       </a:bgFillStyleLst>
     </a:fmtScheme>
   </a:themeElements>
-  <a:objectDefaults/>
-  <a:extraClrSchemeLst/>
+  <a:extLst>
+    <a:ext uri="{05A4C25C-085E-4340-85A3-A5531E510DB2}">
+      <thm15:themeFamily xmlns:thm15="http://schemas.microsoft.com/office/thememl/2012/main" name="Office Theme" id="{62F939B6-93AF-4DB8-9C6B-D6C7DFDC589F}" vid="{4A3C46E8-61CC-4603-A589-7422A47A8E4A}"/>
+    </a:ext>
+  </a:extLst>
 </a:theme>
 </file>
</xml_diff>